<commit_message>
Adding more things to the presentation and metabolic pathways stuff.
</commit_message>
<xml_diff>
--- a/Reports/lab_scale_SSF_trial_2.pptx
+++ b/Reports/lab_scale_SSF_trial_2.pptx
@@ -21,6 +21,11 @@
     <p:sldId id="268" r:id="rId16"/>
     <p:sldId id="269" r:id="rId17"/>
     <p:sldId id="270" r:id="rId18"/>
+    <p:sldId id="271" r:id="rId19"/>
+    <p:sldId id="272" r:id="rId20"/>
+    <p:sldId id="273" r:id="rId21"/>
+    <p:sldId id="274" r:id="rId22"/>
+    <p:sldId id="275" r:id="rId23"/>
   </p:sldIdLst>
   <p:sldSz cx="12192000" cy="6858000"/>
   <p:notesSz cx="7559675" cy="10691813"/>
@@ -78,7 +83,7 @@
         <p:txBody>
           <a:bodyPr/>
           <a:p>
-            <a:fld id="{DAFD4C9B-FBFE-4FD9-A453-AC4522BE1800}" type="slidenum">
+            <a:fld id="{D28660D0-257B-4E0C-A0AB-FEC595B492CB}" type="slidenum">
               <a:t>&lt;#&gt;</a:t>
             </a:fld>
           </a:p>
@@ -139,8 +144,8 @@
         </p:nvSpPr>
         <p:spPr>
           <a:xfrm>
-            <a:off x="1523880" y="1122480"/>
-            <a:ext cx="9143280" cy="2386800"/>
+            <a:off x="609480" y="273600"/>
+            <a:ext cx="10972440" cy="1144800"/>
           </a:xfrm>
           <a:prstGeom prst="rect">
             <a:avLst/>
@@ -180,7 +185,7 @@
         <p:spPr>
           <a:xfrm>
             <a:off x="609480" y="1604520"/>
-            <a:ext cx="10972080" cy="1896840"/>
+            <a:ext cx="10972440" cy="1896840"/>
           </a:xfrm>
           <a:prstGeom prst="rect">
             <a:avLst/>
@@ -223,7 +228,7 @@
         <p:spPr>
           <a:xfrm>
             <a:off x="609480" y="3682080"/>
-            <a:ext cx="10972080" cy="1896840"/>
+            <a:ext cx="10972440" cy="1896840"/>
           </a:xfrm>
           <a:prstGeom prst="rect">
             <a:avLst/>
@@ -287,7 +292,7 @@
         <p:txBody>
           <a:bodyPr/>
           <a:p>
-            <a:fld id="{EA5AAE1C-E619-4584-AEA7-1E7A7C53AAF6}" type="slidenum">
+            <a:fld id="{1FC03257-3A8B-491A-996E-D16C0207F01D}" type="slidenum">
               <a:t>&lt;#&gt;</a:t>
             </a:fld>
           </a:p>
@@ -348,8 +353,8 @@
         </p:nvSpPr>
         <p:spPr>
           <a:xfrm>
-            <a:off x="1523880" y="1122480"/>
-            <a:ext cx="9143280" cy="2386800"/>
+            <a:off x="609480" y="273600"/>
+            <a:ext cx="10972440" cy="1144800"/>
           </a:xfrm>
           <a:prstGeom prst="rect">
             <a:avLst/>
@@ -582,7 +587,7 @@
         <p:txBody>
           <a:bodyPr/>
           <a:p>
-            <a:fld id="{412A73BC-4FDF-4F5D-809E-537A906961D9}" type="slidenum">
+            <a:fld id="{F275C081-5D83-4901-9AA3-FB8E759324A9}" type="slidenum">
               <a:t>&lt;#&gt;</a:t>
             </a:fld>
           </a:p>
@@ -643,8 +648,8 @@
         </p:nvSpPr>
         <p:spPr>
           <a:xfrm>
-            <a:off x="1523880" y="1122480"/>
-            <a:ext cx="9143280" cy="2386800"/>
+            <a:off x="609480" y="273600"/>
+            <a:ext cx="10972440" cy="1144800"/>
           </a:xfrm>
           <a:prstGeom prst="rect">
             <a:avLst/>
@@ -684,7 +689,7 @@
         <p:spPr>
           <a:xfrm>
             <a:off x="609480" y="1604520"/>
-            <a:ext cx="3532680" cy="1896840"/>
+            <a:ext cx="3533040" cy="1896840"/>
           </a:xfrm>
           <a:prstGeom prst="rect">
             <a:avLst/>
@@ -726,8 +731,8 @@
         </p:nvSpPr>
         <p:spPr>
           <a:xfrm>
-            <a:off x="4319280" y="1604520"/>
-            <a:ext cx="3532680" cy="1896840"/>
+            <a:off x="4319640" y="1604520"/>
+            <a:ext cx="3533040" cy="1896840"/>
           </a:xfrm>
           <a:prstGeom prst="rect">
             <a:avLst/>
@@ -769,8 +774,8 @@
         </p:nvSpPr>
         <p:spPr>
           <a:xfrm>
-            <a:off x="8028720" y="1604520"/>
-            <a:ext cx="3532680" cy="1896840"/>
+            <a:off x="8029800" y="1604520"/>
+            <a:ext cx="3533040" cy="1896840"/>
           </a:xfrm>
           <a:prstGeom prst="rect">
             <a:avLst/>
@@ -813,7 +818,7 @@
         <p:spPr>
           <a:xfrm>
             <a:off x="609480" y="3682080"/>
-            <a:ext cx="3532680" cy="1896840"/>
+            <a:ext cx="3533040" cy="1896840"/>
           </a:xfrm>
           <a:prstGeom prst="rect">
             <a:avLst/>
@@ -855,8 +860,8 @@
         </p:nvSpPr>
         <p:spPr>
           <a:xfrm>
-            <a:off x="4319280" y="3682080"/>
-            <a:ext cx="3532680" cy="1896840"/>
+            <a:off x="4319640" y="3682080"/>
+            <a:ext cx="3533040" cy="1896840"/>
           </a:xfrm>
           <a:prstGeom prst="rect">
             <a:avLst/>
@@ -898,8 +903,8 @@
         </p:nvSpPr>
         <p:spPr>
           <a:xfrm>
-            <a:off x="8028720" y="3682080"/>
-            <a:ext cx="3532680" cy="1896840"/>
+            <a:off x="8029800" y="3682080"/>
+            <a:ext cx="3533040" cy="1896840"/>
           </a:xfrm>
           <a:prstGeom prst="rect">
             <a:avLst/>
@@ -963,7 +968,7 @@
         <p:txBody>
           <a:bodyPr/>
           <a:p>
-            <a:fld id="{DAF1BCE1-45DF-44A3-A482-F154978E53F5}" type="slidenum">
+            <a:fld id="{08306BBD-1756-43DB-9972-8F7EC1F193BC}" type="slidenum">
               <a:t>&lt;#&gt;</a:t>
             </a:fld>
           </a:p>
@@ -1046,7 +1051,7 @@
         <p:txBody>
           <a:bodyPr/>
           <a:p>
-            <a:fld id="{E491EDC0-B518-4A12-AA66-9070C1BA9B90}" type="slidenum">
+            <a:fld id="{93C54FB0-D63A-49DB-8A1B-B5A41F7B7FD2}" type="slidenum">
               <a:t>&lt;#&gt;</a:t>
             </a:fld>
           </a:p>
@@ -1107,8 +1112,8 @@
         </p:nvSpPr>
         <p:spPr>
           <a:xfrm>
-            <a:off x="1523880" y="1122480"/>
-            <a:ext cx="9143280" cy="2386800"/>
+            <a:off x="609480" y="273600"/>
+            <a:ext cx="10972440" cy="1144800"/>
           </a:xfrm>
           <a:prstGeom prst="rect">
             <a:avLst/>
@@ -1148,7 +1153,7 @@
         <p:spPr>
           <a:xfrm>
             <a:off x="609480" y="1604520"/>
-            <a:ext cx="10972080" cy="3976920"/>
+            <a:ext cx="10972440" cy="3977280"/>
           </a:xfrm>
           <a:prstGeom prst="rect">
             <a:avLst/>
@@ -1209,7 +1214,7 @@
         <p:txBody>
           <a:bodyPr/>
           <a:p>
-            <a:fld id="{3A9B0965-0BB7-4A5F-A203-EE3F5CE57FCF}" type="slidenum">
+            <a:fld id="{42DD9127-C70E-40B4-BD77-3D6D03E1AF60}" type="slidenum">
               <a:t>&lt;#&gt;</a:t>
             </a:fld>
           </a:p>
@@ -1270,8 +1275,8 @@
         </p:nvSpPr>
         <p:spPr>
           <a:xfrm>
-            <a:off x="1523880" y="1122480"/>
-            <a:ext cx="9143280" cy="2386800"/>
+            <a:off x="609480" y="273600"/>
+            <a:ext cx="10972440" cy="1144800"/>
           </a:xfrm>
           <a:prstGeom prst="rect">
             <a:avLst/>
@@ -1311,7 +1316,7 @@
         <p:spPr>
           <a:xfrm>
             <a:off x="609480" y="1604520"/>
-            <a:ext cx="10972080" cy="3976920"/>
+            <a:ext cx="10972440" cy="3977280"/>
           </a:xfrm>
           <a:prstGeom prst="rect">
             <a:avLst/>
@@ -1375,7 +1380,7 @@
         <p:txBody>
           <a:bodyPr/>
           <a:p>
-            <a:fld id="{1443D898-6818-4302-8841-0BEA50F5D8D4}" type="slidenum">
+            <a:fld id="{515542E4-6EB3-4EDE-A42C-BFCB5761B62D}" type="slidenum">
               <a:t>&lt;#&gt;</a:t>
             </a:fld>
           </a:p>
@@ -1436,8 +1441,8 @@
         </p:nvSpPr>
         <p:spPr>
           <a:xfrm>
-            <a:off x="1523880" y="1122480"/>
-            <a:ext cx="9143280" cy="2386800"/>
+            <a:off x="609480" y="273600"/>
+            <a:ext cx="10972440" cy="1144800"/>
           </a:xfrm>
           <a:prstGeom prst="rect">
             <a:avLst/>
@@ -1477,7 +1482,7 @@
         <p:spPr>
           <a:xfrm>
             <a:off x="609480" y="1604520"/>
-            <a:ext cx="5354280" cy="3976920"/>
+            <a:ext cx="5354280" cy="3977280"/>
           </a:xfrm>
           <a:prstGeom prst="rect">
             <a:avLst/>
@@ -1520,7 +1525,7 @@
         <p:spPr>
           <a:xfrm>
             <a:off x="6231960" y="1604520"/>
-            <a:ext cx="5354280" cy="3976920"/>
+            <a:ext cx="5354280" cy="3977280"/>
           </a:xfrm>
           <a:prstGeom prst="rect">
             <a:avLst/>
@@ -1584,7 +1589,7 @@
         <p:txBody>
           <a:bodyPr/>
           <a:p>
-            <a:fld id="{24C36596-74DC-44D6-9428-E721C40A7F41}" type="slidenum">
+            <a:fld id="{E25B98F4-E63D-46E1-B1A2-A8877A0D7721}" type="slidenum">
               <a:t>&lt;#&gt;</a:t>
             </a:fld>
           </a:p>
@@ -1645,8 +1650,8 @@
         </p:nvSpPr>
         <p:spPr>
           <a:xfrm>
-            <a:off x="1523880" y="1122480"/>
-            <a:ext cx="9143280" cy="2386800"/>
+            <a:off x="609480" y="273600"/>
+            <a:ext cx="10972440" cy="1144800"/>
           </a:xfrm>
           <a:prstGeom prst="rect">
             <a:avLst/>
@@ -1707,7 +1712,7 @@
         <p:txBody>
           <a:bodyPr/>
           <a:p>
-            <a:fld id="{1C464683-3436-4845-A5D5-5C1242D33445}" type="slidenum">
+            <a:fld id="{97FCB799-49F4-4F1D-9F5F-1CE8733CF51D}" type="slidenum">
               <a:t>&lt;#&gt;</a:t>
             </a:fld>
           </a:p>
@@ -1768,8 +1773,8 @@
         </p:nvSpPr>
         <p:spPr>
           <a:xfrm>
-            <a:off x="1523880" y="1122480"/>
-            <a:ext cx="9143280" cy="11064960"/>
+            <a:off x="609480" y="273600"/>
+            <a:ext cx="10972440" cy="5307840"/>
           </a:xfrm>
           <a:prstGeom prst="rect">
             <a:avLst/>
@@ -1828,7 +1833,7 @@
         <p:txBody>
           <a:bodyPr/>
           <a:p>
-            <a:fld id="{ED872FBC-B2D0-4FF1-A150-ED0F90CF677C}" type="slidenum">
+            <a:fld id="{945BEE9E-D453-4C6C-980A-51803ABF94B5}" type="slidenum">
               <a:t>&lt;#&gt;</a:t>
             </a:fld>
           </a:p>
@@ -1889,8 +1894,8 @@
         </p:nvSpPr>
         <p:spPr>
           <a:xfrm>
-            <a:off x="1523880" y="1122480"/>
-            <a:ext cx="9143280" cy="2386800"/>
+            <a:off x="609480" y="273600"/>
+            <a:ext cx="10972440" cy="1144800"/>
           </a:xfrm>
           <a:prstGeom prst="rect">
             <a:avLst/>
@@ -1973,7 +1978,7 @@
         <p:spPr>
           <a:xfrm>
             <a:off x="6231960" y="1604520"/>
-            <a:ext cx="5354280" cy="3976920"/>
+            <a:ext cx="5354280" cy="3977280"/>
           </a:xfrm>
           <a:prstGeom prst="rect">
             <a:avLst/>
@@ -2080,7 +2085,7 @@
         <p:txBody>
           <a:bodyPr/>
           <a:p>
-            <a:fld id="{642FBD61-7C5D-410C-953D-C17B7D12D83D}" type="slidenum">
+            <a:fld id="{45FEC28A-4724-4B92-8B22-3B37ADDCDFCD}" type="slidenum">
               <a:t>&lt;#&gt;</a:t>
             </a:fld>
           </a:p>
@@ -2141,8 +2146,8 @@
         </p:nvSpPr>
         <p:spPr>
           <a:xfrm>
-            <a:off x="1523880" y="1122480"/>
-            <a:ext cx="9143280" cy="2386800"/>
+            <a:off x="609480" y="273600"/>
+            <a:ext cx="10972440" cy="1144800"/>
           </a:xfrm>
           <a:prstGeom prst="rect">
             <a:avLst/>
@@ -2182,7 +2187,7 @@
         <p:spPr>
           <a:xfrm>
             <a:off x="609480" y="1604520"/>
-            <a:ext cx="10972080" cy="3976920"/>
+            <a:ext cx="10972440" cy="3977280"/>
           </a:xfrm>
           <a:prstGeom prst="rect">
             <a:avLst/>
@@ -2243,7 +2248,7 @@
         <p:txBody>
           <a:bodyPr/>
           <a:p>
-            <a:fld id="{F0962227-A926-4880-8681-0FC6D1C9DBD9}" type="slidenum">
+            <a:fld id="{363AAE3F-FA0E-484E-A015-9480D8508299}" type="slidenum">
               <a:t>&lt;#&gt;</a:t>
             </a:fld>
           </a:p>
@@ -2304,8 +2309,8 @@
         </p:nvSpPr>
         <p:spPr>
           <a:xfrm>
-            <a:off x="1523880" y="1122480"/>
-            <a:ext cx="9143280" cy="2386800"/>
+            <a:off x="609480" y="273600"/>
+            <a:ext cx="10972440" cy="1144800"/>
           </a:xfrm>
           <a:prstGeom prst="rect">
             <a:avLst/>
@@ -2345,7 +2350,7 @@
         <p:spPr>
           <a:xfrm>
             <a:off x="609480" y="1604520"/>
-            <a:ext cx="5354280" cy="3976920"/>
+            <a:ext cx="5354280" cy="3977280"/>
           </a:xfrm>
           <a:prstGeom prst="rect">
             <a:avLst/>
@@ -2495,7 +2500,7 @@
         <p:txBody>
           <a:bodyPr/>
           <a:p>
-            <a:fld id="{4FED59DA-E376-4406-8054-40150653F298}" type="slidenum">
+            <a:fld id="{525842B7-D6B4-4BCF-B3C8-207F5464F256}" type="slidenum">
               <a:t>&lt;#&gt;</a:t>
             </a:fld>
           </a:p>
@@ -2556,8 +2561,8 @@
         </p:nvSpPr>
         <p:spPr>
           <a:xfrm>
-            <a:off x="1523880" y="1122480"/>
-            <a:ext cx="9143280" cy="2386800"/>
+            <a:off x="609480" y="273600"/>
+            <a:ext cx="10972440" cy="1144800"/>
           </a:xfrm>
           <a:prstGeom prst="rect">
             <a:avLst/>
@@ -2683,7 +2688,7 @@
         <p:spPr>
           <a:xfrm>
             <a:off x="609480" y="3682080"/>
-            <a:ext cx="10972080" cy="1896840"/>
+            <a:ext cx="10972440" cy="1896840"/>
           </a:xfrm>
           <a:prstGeom prst="rect">
             <a:avLst/>
@@ -2747,7 +2752,7 @@
         <p:txBody>
           <a:bodyPr/>
           <a:p>
-            <a:fld id="{75D30215-4627-4D4D-94AD-932FF0A7A2AA}" type="slidenum">
+            <a:fld id="{B59B7690-D3B7-4939-A989-913FA1A5396B}" type="slidenum">
               <a:t>&lt;#&gt;</a:t>
             </a:fld>
           </a:p>
@@ -2808,8 +2813,8 @@
         </p:nvSpPr>
         <p:spPr>
           <a:xfrm>
-            <a:off x="1523880" y="1122480"/>
-            <a:ext cx="9143280" cy="2386800"/>
+            <a:off x="609480" y="273600"/>
+            <a:ext cx="10972440" cy="1144800"/>
           </a:xfrm>
           <a:prstGeom prst="rect">
             <a:avLst/>
@@ -2849,7 +2854,7 @@
         <p:spPr>
           <a:xfrm>
             <a:off x="609480" y="1604520"/>
-            <a:ext cx="10972080" cy="1896840"/>
+            <a:ext cx="10972440" cy="1896840"/>
           </a:xfrm>
           <a:prstGeom prst="rect">
             <a:avLst/>
@@ -2892,7 +2897,7 @@
         <p:spPr>
           <a:xfrm>
             <a:off x="609480" y="3682080"/>
-            <a:ext cx="10972080" cy="1896840"/>
+            <a:ext cx="10972440" cy="1896840"/>
           </a:xfrm>
           <a:prstGeom prst="rect">
             <a:avLst/>
@@ -2956,7 +2961,7 @@
         <p:txBody>
           <a:bodyPr/>
           <a:p>
-            <a:fld id="{1F206C06-FD9B-4BE2-8264-53E7CC4BBC38}" type="slidenum">
+            <a:fld id="{A58997CA-8D78-4833-B857-3F06036272A4}" type="slidenum">
               <a:t>&lt;#&gt;</a:t>
             </a:fld>
           </a:p>
@@ -3017,8 +3022,8 @@
         </p:nvSpPr>
         <p:spPr>
           <a:xfrm>
-            <a:off x="1523880" y="1122480"/>
-            <a:ext cx="9143280" cy="2386800"/>
+            <a:off x="609480" y="273600"/>
+            <a:ext cx="10972440" cy="1144800"/>
           </a:xfrm>
           <a:prstGeom prst="rect">
             <a:avLst/>
@@ -3251,7 +3256,7 @@
         <p:txBody>
           <a:bodyPr/>
           <a:p>
-            <a:fld id="{19333A56-9F01-472F-B1C4-CC1E6321EDEF}" type="slidenum">
+            <a:fld id="{9E1D1215-8FBE-4B51-9688-0FDA62E4F9AB}" type="slidenum">
               <a:t>&lt;#&gt;</a:t>
             </a:fld>
           </a:p>
@@ -3312,8 +3317,8 @@
         </p:nvSpPr>
         <p:spPr>
           <a:xfrm>
-            <a:off x="1523880" y="1122480"/>
-            <a:ext cx="9143280" cy="2386800"/>
+            <a:off x="609480" y="273600"/>
+            <a:ext cx="10972440" cy="1144800"/>
           </a:xfrm>
           <a:prstGeom prst="rect">
             <a:avLst/>
@@ -3353,7 +3358,7 @@
         <p:spPr>
           <a:xfrm>
             <a:off x="609480" y="1604520"/>
-            <a:ext cx="3532680" cy="1896840"/>
+            <a:ext cx="3533040" cy="1896840"/>
           </a:xfrm>
           <a:prstGeom prst="rect">
             <a:avLst/>
@@ -3395,8 +3400,8 @@
         </p:nvSpPr>
         <p:spPr>
           <a:xfrm>
-            <a:off x="4319280" y="1604520"/>
-            <a:ext cx="3532680" cy="1896840"/>
+            <a:off x="4319640" y="1604520"/>
+            <a:ext cx="3533040" cy="1896840"/>
           </a:xfrm>
           <a:prstGeom prst="rect">
             <a:avLst/>
@@ -3438,8 +3443,8 @@
         </p:nvSpPr>
         <p:spPr>
           <a:xfrm>
-            <a:off x="8028720" y="1604520"/>
-            <a:ext cx="3532680" cy="1896840"/>
+            <a:off x="8029800" y="1604520"/>
+            <a:ext cx="3533040" cy="1896840"/>
           </a:xfrm>
           <a:prstGeom prst="rect">
             <a:avLst/>
@@ -3482,7 +3487,7 @@
         <p:spPr>
           <a:xfrm>
             <a:off x="609480" y="3682080"/>
-            <a:ext cx="3532680" cy="1896840"/>
+            <a:ext cx="3533040" cy="1896840"/>
           </a:xfrm>
           <a:prstGeom prst="rect">
             <a:avLst/>
@@ -3524,8 +3529,8 @@
         </p:nvSpPr>
         <p:spPr>
           <a:xfrm>
-            <a:off x="4319280" y="3682080"/>
-            <a:ext cx="3532680" cy="1896840"/>
+            <a:off x="4319640" y="3682080"/>
+            <a:ext cx="3533040" cy="1896840"/>
           </a:xfrm>
           <a:prstGeom prst="rect">
             <a:avLst/>
@@ -3567,8 +3572,8 @@
         </p:nvSpPr>
         <p:spPr>
           <a:xfrm>
-            <a:off x="8028720" y="3682080"/>
-            <a:ext cx="3532680" cy="1896840"/>
+            <a:off x="8029800" y="3682080"/>
+            <a:ext cx="3533040" cy="1896840"/>
           </a:xfrm>
           <a:prstGeom prst="rect">
             <a:avLst/>
@@ -3632,7 +3637,7 @@
         <p:txBody>
           <a:bodyPr/>
           <a:p>
-            <a:fld id="{4CF036FB-7EE4-43E8-A881-C1CD260FD150}" type="slidenum">
+            <a:fld id="{92BA6968-3A3F-42BA-BA01-380F883987FD}" type="slidenum">
               <a:t>&lt;#&gt;</a:t>
             </a:fld>
           </a:p>
@@ -3693,8 +3698,8 @@
         </p:nvSpPr>
         <p:spPr>
           <a:xfrm>
-            <a:off x="1523880" y="1122480"/>
-            <a:ext cx="9143280" cy="2386800"/>
+            <a:off x="609480" y="273600"/>
+            <a:ext cx="10972440" cy="1144800"/>
           </a:xfrm>
           <a:prstGeom prst="rect">
             <a:avLst/>
@@ -3734,7 +3739,7 @@
         <p:spPr>
           <a:xfrm>
             <a:off x="609480" y="1604520"/>
-            <a:ext cx="10972080" cy="3976920"/>
+            <a:ext cx="10972440" cy="3977280"/>
           </a:xfrm>
           <a:prstGeom prst="rect">
             <a:avLst/>
@@ -3798,7 +3803,7 @@
         <p:txBody>
           <a:bodyPr/>
           <a:p>
-            <a:fld id="{FA8EE46C-7659-4935-9BE0-D6D33FB4AF77}" type="slidenum">
+            <a:fld id="{075F767F-C5AF-4562-B0C1-E2D8ADC0E065}" type="slidenum">
               <a:t>&lt;#&gt;</a:t>
             </a:fld>
           </a:p>
@@ -3859,8 +3864,8 @@
         </p:nvSpPr>
         <p:spPr>
           <a:xfrm>
-            <a:off x="1523880" y="1122480"/>
-            <a:ext cx="9143280" cy="2386800"/>
+            <a:off x="609480" y="273600"/>
+            <a:ext cx="10972440" cy="1144800"/>
           </a:xfrm>
           <a:prstGeom prst="rect">
             <a:avLst/>
@@ -3900,7 +3905,7 @@
         <p:spPr>
           <a:xfrm>
             <a:off x="609480" y="1604520"/>
-            <a:ext cx="5354280" cy="3976920"/>
+            <a:ext cx="5354280" cy="3977280"/>
           </a:xfrm>
           <a:prstGeom prst="rect">
             <a:avLst/>
@@ -3943,7 +3948,7 @@
         <p:spPr>
           <a:xfrm>
             <a:off x="6231960" y="1604520"/>
-            <a:ext cx="5354280" cy="3976920"/>
+            <a:ext cx="5354280" cy="3977280"/>
           </a:xfrm>
           <a:prstGeom prst="rect">
             <a:avLst/>
@@ -4007,7 +4012,7 @@
         <p:txBody>
           <a:bodyPr/>
           <a:p>
-            <a:fld id="{F5B82A45-DC75-4D2B-85C7-65866DE3979D}" type="slidenum">
+            <a:fld id="{9A37BA75-0C4F-423E-9CF8-6F88A1D4B9BA}" type="slidenum">
               <a:t>&lt;#&gt;</a:t>
             </a:fld>
           </a:p>
@@ -4068,8 +4073,8 @@
         </p:nvSpPr>
         <p:spPr>
           <a:xfrm>
-            <a:off x="1523880" y="1122480"/>
-            <a:ext cx="9143280" cy="2386800"/>
+            <a:off x="609480" y="273600"/>
+            <a:ext cx="10972440" cy="1144800"/>
           </a:xfrm>
           <a:prstGeom prst="rect">
             <a:avLst/>
@@ -4130,7 +4135,7 @@
         <p:txBody>
           <a:bodyPr/>
           <a:p>
-            <a:fld id="{A04622DE-4CD7-4626-B9C0-9D3A3058BF29}" type="slidenum">
+            <a:fld id="{B305ACD5-75D9-4B7A-B165-6C87CF199D45}" type="slidenum">
               <a:t>&lt;#&gt;</a:t>
             </a:fld>
           </a:p>
@@ -4191,8 +4196,8 @@
         </p:nvSpPr>
         <p:spPr>
           <a:xfrm>
-            <a:off x="1523880" y="1122480"/>
-            <a:ext cx="9143280" cy="11064960"/>
+            <a:off x="609480" y="273600"/>
+            <a:ext cx="10972440" cy="5307840"/>
           </a:xfrm>
           <a:prstGeom prst="rect">
             <a:avLst/>
@@ -4251,7 +4256,7 @@
         <p:txBody>
           <a:bodyPr/>
           <a:p>
-            <a:fld id="{6B85EB3E-855E-40B0-B621-A9AA77DAD933}" type="slidenum">
+            <a:fld id="{E8681CB4-7230-4EAD-A1F2-2CACB5A0A05D}" type="slidenum">
               <a:t>&lt;#&gt;</a:t>
             </a:fld>
           </a:p>
@@ -4312,8 +4317,8 @@
         </p:nvSpPr>
         <p:spPr>
           <a:xfrm>
-            <a:off x="1523880" y="1122480"/>
-            <a:ext cx="9143280" cy="2386800"/>
+            <a:off x="609480" y="273600"/>
+            <a:ext cx="10972440" cy="1144800"/>
           </a:xfrm>
           <a:prstGeom prst="rect">
             <a:avLst/>
@@ -4396,7 +4401,7 @@
         <p:spPr>
           <a:xfrm>
             <a:off x="6231960" y="1604520"/>
-            <a:ext cx="5354280" cy="3976920"/>
+            <a:ext cx="5354280" cy="3977280"/>
           </a:xfrm>
           <a:prstGeom prst="rect">
             <a:avLst/>
@@ -4503,7 +4508,7 @@
         <p:txBody>
           <a:bodyPr/>
           <a:p>
-            <a:fld id="{C3B755F2-6204-4407-9914-CD837A7D6454}" type="slidenum">
+            <a:fld id="{5E6D2DCF-0C78-4493-B1FB-4A53C2127F5F}" type="slidenum">
               <a:t>&lt;#&gt;</a:t>
             </a:fld>
           </a:p>
@@ -4564,8 +4569,8 @@
         </p:nvSpPr>
         <p:spPr>
           <a:xfrm>
-            <a:off x="1523880" y="1122480"/>
-            <a:ext cx="9143280" cy="2386800"/>
+            <a:off x="609480" y="273600"/>
+            <a:ext cx="10972440" cy="1144800"/>
           </a:xfrm>
           <a:prstGeom prst="rect">
             <a:avLst/>
@@ -4605,7 +4610,7 @@
         <p:spPr>
           <a:xfrm>
             <a:off x="609480" y="1604520"/>
-            <a:ext cx="5354280" cy="3976920"/>
+            <a:ext cx="5354280" cy="3977280"/>
           </a:xfrm>
           <a:prstGeom prst="rect">
             <a:avLst/>
@@ -4755,7 +4760,7 @@
         <p:txBody>
           <a:bodyPr/>
           <a:p>
-            <a:fld id="{0D3F94F1-3CB0-480F-8A30-27987D474E96}" type="slidenum">
+            <a:fld id="{326AA49C-30A1-41EE-B36D-871FD739B221}" type="slidenum">
               <a:t>&lt;#&gt;</a:t>
             </a:fld>
           </a:p>
@@ -4816,8 +4821,8 @@
         </p:nvSpPr>
         <p:spPr>
           <a:xfrm>
-            <a:off x="1523880" y="1122480"/>
-            <a:ext cx="9143280" cy="2386800"/>
+            <a:off x="609480" y="273600"/>
+            <a:ext cx="10972440" cy="1144800"/>
           </a:xfrm>
           <a:prstGeom prst="rect">
             <a:avLst/>
@@ -4943,7 +4948,7 @@
         <p:spPr>
           <a:xfrm>
             <a:off x="609480" y="3682080"/>
-            <a:ext cx="10972080" cy="1896840"/>
+            <a:ext cx="10972440" cy="1896840"/>
           </a:xfrm>
           <a:prstGeom prst="rect">
             <a:avLst/>
@@ -5007,7 +5012,7 @@
         <p:txBody>
           <a:bodyPr/>
           <a:p>
-            <a:fld id="{99C6D2B5-2183-4713-A375-F44950B0A1E6}" type="slidenum">
+            <a:fld id="{38A64BAD-8B40-4133-9CA2-536C4961570C}" type="slidenum">
               <a:t>&lt;#&gt;</a:t>
             </a:fld>
           </a:p>
@@ -5076,7 +5081,7 @@
         <p:spPr>
           <a:xfrm>
             <a:off x="1523880" y="1122480"/>
-            <a:ext cx="9143280" cy="2386800"/>
+            <a:ext cx="9142920" cy="2386440"/>
           </a:xfrm>
           <a:prstGeom prst="rect">
             <a:avLst/>
@@ -5119,13 +5124,238 @@
             <a:spLocks noGrp="1"/>
           </p:cNvSpPr>
           <p:nvPr>
+            <p:ph type="body"/>
+          </p:nvPr>
+        </p:nvSpPr>
+        <p:spPr>
+          <a:xfrm>
+            <a:off x="609480" y="1604520"/>
+            <a:ext cx="10971720" cy="3976560"/>
+          </a:xfrm>
+          <a:prstGeom prst="rect">
+            <a:avLst/>
+          </a:prstGeom>
+          <a:noFill/>
+          <a:ln w="0">
+            <a:noFill/>
+          </a:ln>
+        </p:spPr>
+        <p:txBody>
+          <a:bodyPr lIns="0" rIns="0" tIns="0" bIns="0" anchor="t">
+            <a:normAutofit/>
+          </a:bodyPr>
+          <a:p>
+            <a:pPr marL="432000" indent="-324000">
+              <a:spcBef>
+                <a:spcPts val="1417"/>
+              </a:spcBef>
+              <a:buClr>
+                <a:srgbClr val="000000"/>
+              </a:buClr>
+              <a:buSzPct val="45000"/>
+              <a:buFont typeface="Wingdings" charset="2"/>
+              <a:buChar char=""/>
+            </a:pPr>
+            <a:r>
+              <a:rPr b="0" lang="en-US" sz="1800" spc="-1" strike="noStrike">
+                <a:solidFill>
+                  <a:srgbClr val="000000"/>
+                </a:solidFill>
+                <a:latin typeface="Arial"/>
+              </a:rPr>
+              <a:t>Click to edit the outline text format</a:t>
+            </a:r>
+            <a:endParaRPr b="0" lang="en-US" sz="1800" spc="-1" strike="noStrike">
+              <a:solidFill>
+                <a:srgbClr val="000000"/>
+              </a:solidFill>
+              <a:latin typeface="Arial"/>
+            </a:endParaRPr>
+          </a:p>
+          <a:p>
+            <a:pPr lvl="1" marL="864000" indent="-324000">
+              <a:spcBef>
+                <a:spcPts val="1134"/>
+              </a:spcBef>
+              <a:buClr>
+                <a:srgbClr val="000000"/>
+              </a:buClr>
+              <a:buSzPct val="75000"/>
+              <a:buFont typeface="Symbol" charset="2"/>
+              <a:buChar char=""/>
+            </a:pPr>
+            <a:r>
+              <a:rPr b="0" lang="en-US" sz="1800" spc="-1" strike="noStrike">
+                <a:solidFill>
+                  <a:srgbClr val="000000"/>
+                </a:solidFill>
+                <a:latin typeface="Arial"/>
+              </a:rPr>
+              <a:t>Second Outline Level</a:t>
+            </a:r>
+            <a:endParaRPr b="0" lang="en-US" sz="1800" spc="-1" strike="noStrike">
+              <a:solidFill>
+                <a:srgbClr val="000000"/>
+              </a:solidFill>
+              <a:latin typeface="Arial"/>
+            </a:endParaRPr>
+          </a:p>
+          <a:p>
+            <a:pPr lvl="2" marL="1296000" indent="-288000">
+              <a:spcBef>
+                <a:spcPts val="850"/>
+              </a:spcBef>
+              <a:buClr>
+                <a:srgbClr val="000000"/>
+              </a:buClr>
+              <a:buSzPct val="45000"/>
+              <a:buFont typeface="Wingdings" charset="2"/>
+              <a:buChar char=""/>
+            </a:pPr>
+            <a:r>
+              <a:rPr b="0" lang="en-US" sz="1800" spc="-1" strike="noStrike">
+                <a:solidFill>
+                  <a:srgbClr val="000000"/>
+                </a:solidFill>
+                <a:latin typeface="Arial"/>
+              </a:rPr>
+              <a:t>Third Outline Level</a:t>
+            </a:r>
+            <a:endParaRPr b="0" lang="en-US" sz="1800" spc="-1" strike="noStrike">
+              <a:solidFill>
+                <a:srgbClr val="000000"/>
+              </a:solidFill>
+              <a:latin typeface="Arial"/>
+            </a:endParaRPr>
+          </a:p>
+          <a:p>
+            <a:pPr lvl="3" marL="1728000" indent="-216000">
+              <a:spcBef>
+                <a:spcPts val="567"/>
+              </a:spcBef>
+              <a:buClr>
+                <a:srgbClr val="000000"/>
+              </a:buClr>
+              <a:buSzPct val="75000"/>
+              <a:buFont typeface="Symbol" charset="2"/>
+              <a:buChar char=""/>
+            </a:pPr>
+            <a:r>
+              <a:rPr b="0" lang="en-US" sz="1800" spc="-1" strike="noStrike">
+                <a:solidFill>
+                  <a:srgbClr val="000000"/>
+                </a:solidFill>
+                <a:latin typeface="Arial"/>
+              </a:rPr>
+              <a:t>Fourth Outline Level</a:t>
+            </a:r>
+            <a:endParaRPr b="0" lang="en-US" sz="1800" spc="-1" strike="noStrike">
+              <a:solidFill>
+                <a:srgbClr val="000000"/>
+              </a:solidFill>
+              <a:latin typeface="Arial"/>
+            </a:endParaRPr>
+          </a:p>
+          <a:p>
+            <a:pPr lvl="4" marL="2160000" indent="-216000">
+              <a:spcBef>
+                <a:spcPts val="283"/>
+              </a:spcBef>
+              <a:buClr>
+                <a:srgbClr val="000000"/>
+              </a:buClr>
+              <a:buSzPct val="45000"/>
+              <a:buFont typeface="Wingdings" charset="2"/>
+              <a:buChar char=""/>
+            </a:pPr>
+            <a:r>
+              <a:rPr b="0" lang="en-US" sz="1800" spc="-1" strike="noStrike">
+                <a:solidFill>
+                  <a:srgbClr val="000000"/>
+                </a:solidFill>
+                <a:latin typeface="Arial"/>
+              </a:rPr>
+              <a:t>Fifth Outline Level</a:t>
+            </a:r>
+            <a:endParaRPr b="0" lang="en-US" sz="1800" spc="-1" strike="noStrike">
+              <a:solidFill>
+                <a:srgbClr val="000000"/>
+              </a:solidFill>
+              <a:latin typeface="Arial"/>
+            </a:endParaRPr>
+          </a:p>
+          <a:p>
+            <a:pPr lvl="5" marL="2592000" indent="-216000">
+              <a:spcBef>
+                <a:spcPts val="283"/>
+              </a:spcBef>
+              <a:buClr>
+                <a:srgbClr val="000000"/>
+              </a:buClr>
+              <a:buSzPct val="45000"/>
+              <a:buFont typeface="Wingdings" charset="2"/>
+              <a:buChar char=""/>
+            </a:pPr>
+            <a:r>
+              <a:rPr b="0" lang="en-US" sz="1800" spc="-1" strike="noStrike">
+                <a:solidFill>
+                  <a:srgbClr val="000000"/>
+                </a:solidFill>
+                <a:latin typeface="Arial"/>
+              </a:rPr>
+              <a:t>Sixth Outline Level</a:t>
+            </a:r>
+            <a:endParaRPr b="0" lang="en-US" sz="1800" spc="-1" strike="noStrike">
+              <a:solidFill>
+                <a:srgbClr val="000000"/>
+              </a:solidFill>
+              <a:latin typeface="Arial"/>
+            </a:endParaRPr>
+          </a:p>
+          <a:p>
+            <a:pPr lvl="6" marL="3024000" indent="-216000">
+              <a:spcBef>
+                <a:spcPts val="283"/>
+              </a:spcBef>
+              <a:buClr>
+                <a:srgbClr val="000000"/>
+              </a:buClr>
+              <a:buSzPct val="45000"/>
+              <a:buFont typeface="Wingdings" charset="2"/>
+              <a:buChar char=""/>
+            </a:pPr>
+            <a:r>
+              <a:rPr b="0" lang="en-US" sz="1800" spc="-1" strike="noStrike">
+                <a:solidFill>
+                  <a:srgbClr val="000000"/>
+                </a:solidFill>
+                <a:latin typeface="Arial"/>
+              </a:rPr>
+              <a:t>Seventh Outline Level</a:t>
+            </a:r>
+            <a:endParaRPr b="0" lang="en-US" sz="1800" spc="-1" strike="noStrike">
+              <a:solidFill>
+                <a:srgbClr val="000000"/>
+              </a:solidFill>
+              <a:latin typeface="Arial"/>
+            </a:endParaRPr>
+          </a:p>
+        </p:txBody>
+      </p:sp>
+      <p:sp>
+        <p:nvSpPr>
+          <p:cNvPr id="2" name="PlaceHolder 3"/>
+          <p:cNvSpPr>
+            <a:spLocks noGrp="1"/>
+          </p:cNvSpPr>
+          <p:nvPr>
             <p:ph type="ftr" idx="1"/>
           </p:nvPr>
         </p:nvSpPr>
         <p:spPr>
           <a:xfrm>
             <a:off x="4038480" y="6356520"/>
-            <a:ext cx="4114080" cy="364320"/>
+            <a:ext cx="4113720" cy="363960"/>
           </a:xfrm>
           <a:prstGeom prst="rect">
             <a:avLst/>
@@ -5186,7 +5416,7 @@
       </p:sp>
       <p:sp>
         <p:nvSpPr>
-          <p:cNvPr id="2" name="PlaceHolder 3"/>
+          <p:cNvPr id="3" name="PlaceHolder 4"/>
           <p:cNvSpPr>
             <a:spLocks noGrp="1"/>
           </p:cNvSpPr>
@@ -5197,7 +5427,7 @@
         <p:spPr>
           <a:xfrm>
             <a:off x="8610480" y="6356520"/>
-            <a:ext cx="2742480" cy="364320"/>
+            <a:ext cx="2742120" cy="363960"/>
           </a:xfrm>
           <a:prstGeom prst="rect">
             <a:avLst/>
@@ -5240,7 +5470,7 @@
                 <a:tab algn="l" pos="0"/>
               </a:tabLst>
             </a:pPr>
-            <a:fld id="{41ED8104-CB11-4E24-BA1E-791E3C730593}" type="slidenum">
+            <a:fld id="{5F3077E3-BEE8-4C26-870B-84664D67E8CE}" type="slidenum">
               <a:rPr b="0" lang="el-GR" sz="1200" spc="-1" strike="noStrike">
                 <a:solidFill>
                   <a:schemeClr val="dk1">
@@ -5262,7 +5492,7 @@
       </p:sp>
       <p:sp>
         <p:nvSpPr>
-          <p:cNvPr id="3" name="PlaceHolder 4"/>
+          <p:cNvPr id="4" name="PlaceHolder 5"/>
           <p:cNvSpPr>
             <a:spLocks noGrp="1"/>
           </p:cNvSpPr>
@@ -5273,7 +5503,7 @@
         <p:spPr>
           <a:xfrm>
             <a:off x="838080" y="6356520"/>
-            <a:ext cx="2742480" cy="364320"/>
+            <a:ext cx="2742120" cy="363960"/>
           </a:xfrm>
           <a:prstGeom prst="rect">
             <a:avLst/>
@@ -5316,231 +5546,6 @@
                 <a:srgbClr val="000000"/>
               </a:solidFill>
               <a:latin typeface="Times New Roman"/>
-            </a:endParaRPr>
-          </a:p>
-        </p:txBody>
-      </p:sp>
-      <p:sp>
-        <p:nvSpPr>
-          <p:cNvPr id="4" name="PlaceHolder 5"/>
-          <p:cNvSpPr>
-            <a:spLocks noGrp="1"/>
-          </p:cNvSpPr>
-          <p:nvPr>
-            <p:ph type="body"/>
-          </p:nvPr>
-        </p:nvSpPr>
-        <p:spPr>
-          <a:xfrm>
-            <a:off x="609480" y="1604520"/>
-            <a:ext cx="10972440" cy="3977280"/>
-          </a:xfrm>
-          <a:prstGeom prst="rect">
-            <a:avLst/>
-          </a:prstGeom>
-          <a:noFill/>
-          <a:ln w="0">
-            <a:noFill/>
-          </a:ln>
-        </p:spPr>
-        <p:txBody>
-          <a:bodyPr lIns="0" rIns="0" tIns="0" bIns="0" anchor="t">
-            <a:normAutofit/>
-          </a:bodyPr>
-          <a:p>
-            <a:pPr marL="432000" indent="-324000">
-              <a:spcBef>
-                <a:spcPts val="1417"/>
-              </a:spcBef>
-              <a:buClr>
-                <a:srgbClr val="000000"/>
-              </a:buClr>
-              <a:buSzPct val="45000"/>
-              <a:buFont typeface="Wingdings" charset="2"/>
-              <a:buChar char=""/>
-            </a:pPr>
-            <a:r>
-              <a:rPr b="0" lang="en-US" sz="3200" spc="-1" strike="noStrike">
-                <a:solidFill>
-                  <a:srgbClr val="000000"/>
-                </a:solidFill>
-                <a:latin typeface="Arial"/>
-              </a:rPr>
-              <a:t>Click to edit the outline text format</a:t>
-            </a:r>
-            <a:endParaRPr b="0" lang="en-US" sz="3200" spc="-1" strike="noStrike">
-              <a:solidFill>
-                <a:srgbClr val="000000"/>
-              </a:solidFill>
-              <a:latin typeface="Arial"/>
-            </a:endParaRPr>
-          </a:p>
-          <a:p>
-            <a:pPr lvl="1" marL="864000" indent="-324000">
-              <a:spcBef>
-                <a:spcPts val="1134"/>
-              </a:spcBef>
-              <a:buClr>
-                <a:srgbClr val="000000"/>
-              </a:buClr>
-              <a:buSzPct val="75000"/>
-              <a:buFont typeface="Symbol" charset="2"/>
-              <a:buChar char=""/>
-            </a:pPr>
-            <a:r>
-              <a:rPr b="0" lang="en-US" sz="2800" spc="-1" strike="noStrike">
-                <a:solidFill>
-                  <a:srgbClr val="000000"/>
-                </a:solidFill>
-                <a:latin typeface="Arial"/>
-              </a:rPr>
-              <a:t>Second Outline Level</a:t>
-            </a:r>
-            <a:endParaRPr b="0" lang="en-US" sz="2800" spc="-1" strike="noStrike">
-              <a:solidFill>
-                <a:srgbClr val="000000"/>
-              </a:solidFill>
-              <a:latin typeface="Arial"/>
-            </a:endParaRPr>
-          </a:p>
-          <a:p>
-            <a:pPr lvl="2" marL="1296000" indent="-288000">
-              <a:spcBef>
-                <a:spcPts val="850"/>
-              </a:spcBef>
-              <a:buClr>
-                <a:srgbClr val="000000"/>
-              </a:buClr>
-              <a:buSzPct val="45000"/>
-              <a:buFont typeface="Wingdings" charset="2"/>
-              <a:buChar char=""/>
-            </a:pPr>
-            <a:r>
-              <a:rPr b="0" lang="en-US" sz="2400" spc="-1" strike="noStrike">
-                <a:solidFill>
-                  <a:srgbClr val="000000"/>
-                </a:solidFill>
-                <a:latin typeface="Arial"/>
-              </a:rPr>
-              <a:t>Third Outline Level</a:t>
-            </a:r>
-            <a:endParaRPr b="0" lang="en-US" sz="2400" spc="-1" strike="noStrike">
-              <a:solidFill>
-                <a:srgbClr val="000000"/>
-              </a:solidFill>
-              <a:latin typeface="Arial"/>
-            </a:endParaRPr>
-          </a:p>
-          <a:p>
-            <a:pPr lvl="3" marL="1728000" indent="-216000">
-              <a:spcBef>
-                <a:spcPts val="567"/>
-              </a:spcBef>
-              <a:buClr>
-                <a:srgbClr val="000000"/>
-              </a:buClr>
-              <a:buSzPct val="75000"/>
-              <a:buFont typeface="Symbol" charset="2"/>
-              <a:buChar char=""/>
-            </a:pPr>
-            <a:r>
-              <a:rPr b="0" lang="en-US" sz="2000" spc="-1" strike="noStrike">
-                <a:solidFill>
-                  <a:srgbClr val="000000"/>
-                </a:solidFill>
-                <a:latin typeface="Arial"/>
-              </a:rPr>
-              <a:t>Fourth Outline Level</a:t>
-            </a:r>
-            <a:endParaRPr b="0" lang="en-US" sz="2000" spc="-1" strike="noStrike">
-              <a:solidFill>
-                <a:srgbClr val="000000"/>
-              </a:solidFill>
-              <a:latin typeface="Arial"/>
-            </a:endParaRPr>
-          </a:p>
-          <a:p>
-            <a:pPr lvl="4" marL="2160000" indent="-216000">
-              <a:spcBef>
-                <a:spcPts val="283"/>
-              </a:spcBef>
-              <a:buClr>
-                <a:srgbClr val="000000"/>
-              </a:buClr>
-              <a:buSzPct val="45000"/>
-              <a:buFont typeface="Wingdings" charset="2"/>
-              <a:buChar char=""/>
-            </a:pPr>
-            <a:r>
-              <a:rPr b="0" lang="en-US" sz="2000" spc="-1" strike="noStrike">
-                <a:solidFill>
-                  <a:srgbClr val="000000"/>
-                </a:solidFill>
-                <a:latin typeface="Arial"/>
-              </a:rPr>
-              <a:t>Fifth Outline Level</a:t>
-            </a:r>
-            <a:endParaRPr b="0" lang="en-US" sz="2000" spc="-1" strike="noStrike">
-              <a:solidFill>
-                <a:srgbClr val="000000"/>
-              </a:solidFill>
-              <a:latin typeface="Arial"/>
-            </a:endParaRPr>
-          </a:p>
-          <a:p>
-            <a:pPr lvl="5" marL="2592000" indent="-216000">
-              <a:spcBef>
-                <a:spcPts val="283"/>
-              </a:spcBef>
-              <a:buClr>
-                <a:srgbClr val="000000"/>
-              </a:buClr>
-              <a:buSzPct val="45000"/>
-              <a:buFont typeface="Wingdings" charset="2"/>
-              <a:buChar char=""/>
-            </a:pPr>
-            <a:r>
-              <a:rPr b="0" lang="en-US" sz="2000" spc="-1" strike="noStrike">
-                <a:solidFill>
-                  <a:srgbClr val="000000"/>
-                </a:solidFill>
-                <a:latin typeface="Arial"/>
-              </a:rPr>
-              <a:t>Sixth Outline Level</a:t>
-            </a:r>
-            <a:endParaRPr b="0" lang="en-US" sz="2000" spc="-1" strike="noStrike">
-              <a:solidFill>
-                <a:srgbClr val="000000"/>
-              </a:solidFill>
-              <a:latin typeface="Arial"/>
-            </a:endParaRPr>
-          </a:p>
-          <a:p>
-            <a:pPr lvl="6" marL="3024000" indent="-216000">
-              <a:spcBef>
-                <a:spcPts val="283"/>
-              </a:spcBef>
-              <a:buClr>
-                <a:srgbClr val="000000"/>
-              </a:buClr>
-              <a:buSzPct val="45000"/>
-              <a:buFont typeface="Wingdings" charset="2"/>
-              <a:buChar char=""/>
-            </a:pPr>
-            <a:r>
-              <a:rPr b="0" lang="en-US" sz="2000" spc="-1" strike="noStrike">
-                <a:solidFill>
-                  <a:srgbClr val="000000"/>
-                </a:solidFill>
-                <a:latin typeface="Arial"/>
-              </a:rPr>
-              <a:t>Seventh Outline Level</a:t>
-            </a:r>
-            <a:endParaRPr b="0" lang="en-US" sz="2000" spc="-1" strike="noStrike">
-              <a:solidFill>
-                <a:srgbClr val="000000"/>
-              </a:solidFill>
-              <a:latin typeface="Arial"/>
             </a:endParaRPr>
           </a:p>
         </p:txBody>
@@ -5596,287 +5601,13 @@
             <a:spLocks noGrp="1"/>
           </p:cNvSpPr>
           <p:nvPr>
-            <p:ph type="title"/>
-          </p:nvPr>
-        </p:nvSpPr>
-        <p:spPr>
-          <a:xfrm>
-            <a:off x="1523880" y="1122480"/>
-            <a:ext cx="9143280" cy="2386800"/>
-          </a:xfrm>
-          <a:prstGeom prst="rect">
-            <a:avLst/>
-          </a:prstGeom>
-          <a:noFill/>
-          <a:ln w="0">
-            <a:noFill/>
-          </a:ln>
-        </p:spPr>
-        <p:txBody>
-          <a:bodyPr lIns="0" rIns="0" tIns="0" bIns="0" anchor="ctr">
-            <a:noAutofit/>
-          </a:bodyPr>
-          <a:p>
-            <a:pPr indent="0">
-              <a:buNone/>
-            </a:pPr>
-            <a:r>
-              <a:rPr b="0" lang="en-US" sz="1800" spc="-1" strike="noStrike">
-                <a:solidFill>
-                  <a:srgbClr val="000000"/>
-                </a:solidFill>
-                <a:latin typeface="Arial"/>
-              </a:rPr>
-              <a:t>Click to edit the title text format</a:t>
-            </a:r>
-            <a:endParaRPr b="0" lang="en-US" sz="1800" spc="-1" strike="noStrike">
-              <a:solidFill>
-                <a:srgbClr val="000000"/>
-              </a:solidFill>
-              <a:latin typeface="Arial"/>
-            </a:endParaRPr>
-          </a:p>
-        </p:txBody>
-      </p:sp>
-      <p:sp>
-        <p:nvSpPr>
-          <p:cNvPr id="42" name="PlaceHolder 2"/>
-          <p:cNvSpPr>
-            <a:spLocks noGrp="1"/>
-          </p:cNvSpPr>
-          <p:nvPr>
-            <p:ph type="body"/>
-          </p:nvPr>
-        </p:nvSpPr>
-        <p:spPr>
-          <a:xfrm>
-            <a:off x="609480" y="1604520"/>
-            <a:ext cx="10972080" cy="3976920"/>
-          </a:xfrm>
-          <a:prstGeom prst="rect">
-            <a:avLst/>
-          </a:prstGeom>
-          <a:noFill/>
-          <a:ln w="0">
-            <a:noFill/>
-          </a:ln>
-        </p:spPr>
-        <p:txBody>
-          <a:bodyPr lIns="0" rIns="0" tIns="0" bIns="0" anchor="t">
-            <a:normAutofit/>
-          </a:bodyPr>
-          <a:p>
-            <a:pPr marL="432000" indent="-324000">
-              <a:spcBef>
-                <a:spcPts val="1417"/>
-              </a:spcBef>
-              <a:buClr>
-                <a:srgbClr val="000000"/>
-              </a:buClr>
-              <a:buSzPct val="45000"/>
-              <a:buFont typeface="Wingdings" charset="2"/>
-              <a:buChar char=""/>
-            </a:pPr>
-            <a:r>
-              <a:rPr b="0" lang="en-US" sz="1800" spc="-1" strike="noStrike">
-                <a:solidFill>
-                  <a:srgbClr val="000000"/>
-                </a:solidFill>
-                <a:latin typeface="Arial"/>
-              </a:rPr>
-              <a:t>Click to edit the outline text format</a:t>
-            </a:r>
-            <a:endParaRPr b="0" lang="en-US" sz="1800" spc="-1" strike="noStrike">
-              <a:solidFill>
-                <a:srgbClr val="000000"/>
-              </a:solidFill>
-              <a:latin typeface="Arial"/>
-            </a:endParaRPr>
-          </a:p>
-          <a:p>
-            <a:pPr lvl="1" marL="864000" indent="-324000">
-              <a:spcBef>
-                <a:spcPts val="1134"/>
-              </a:spcBef>
-              <a:buClr>
-                <a:srgbClr val="000000"/>
-              </a:buClr>
-              <a:buSzPct val="75000"/>
-              <a:buFont typeface="Symbol" charset="2"/>
-              <a:buChar char=""/>
-            </a:pPr>
-            <a:r>
-              <a:rPr b="0" lang="en-US" sz="1800" spc="-1" strike="noStrike">
-                <a:solidFill>
-                  <a:srgbClr val="000000"/>
-                </a:solidFill>
-                <a:latin typeface="Arial"/>
-              </a:rPr>
-              <a:t>Second Outline Level</a:t>
-            </a:r>
-            <a:endParaRPr b="0" lang="en-US" sz="1800" spc="-1" strike="noStrike">
-              <a:solidFill>
-                <a:srgbClr val="000000"/>
-              </a:solidFill>
-              <a:latin typeface="Arial"/>
-            </a:endParaRPr>
-          </a:p>
-          <a:p>
-            <a:pPr lvl="2" marL="1296000" indent="-288000">
-              <a:spcBef>
-                <a:spcPts val="850"/>
-              </a:spcBef>
-              <a:buClr>
-                <a:srgbClr val="000000"/>
-              </a:buClr>
-              <a:buSzPct val="45000"/>
-              <a:buFont typeface="Wingdings" charset="2"/>
-              <a:buChar char=""/>
-            </a:pPr>
-            <a:r>
-              <a:rPr b="0" lang="en-US" sz="1800" spc="-1" strike="noStrike">
-                <a:solidFill>
-                  <a:srgbClr val="000000"/>
-                </a:solidFill>
-                <a:latin typeface="Arial"/>
-              </a:rPr>
-              <a:t>Third Outline Level</a:t>
-            </a:r>
-            <a:endParaRPr b="0" lang="en-US" sz="1800" spc="-1" strike="noStrike">
-              <a:solidFill>
-                <a:srgbClr val="000000"/>
-              </a:solidFill>
-              <a:latin typeface="Arial"/>
-            </a:endParaRPr>
-          </a:p>
-          <a:p>
-            <a:pPr lvl="3" marL="1728000" indent="-216000">
-              <a:spcBef>
-                <a:spcPts val="567"/>
-              </a:spcBef>
-              <a:buClr>
-                <a:srgbClr val="000000"/>
-              </a:buClr>
-              <a:buSzPct val="75000"/>
-              <a:buFont typeface="Symbol" charset="2"/>
-              <a:buChar char=""/>
-            </a:pPr>
-            <a:r>
-              <a:rPr b="0" lang="en-US" sz="1800" spc="-1" strike="noStrike">
-                <a:solidFill>
-                  <a:srgbClr val="000000"/>
-                </a:solidFill>
-                <a:latin typeface="Arial"/>
-              </a:rPr>
-              <a:t>Fourth Outline Level</a:t>
-            </a:r>
-            <a:endParaRPr b="0" lang="en-US" sz="1800" spc="-1" strike="noStrike">
-              <a:solidFill>
-                <a:srgbClr val="000000"/>
-              </a:solidFill>
-              <a:latin typeface="Arial"/>
-            </a:endParaRPr>
-          </a:p>
-          <a:p>
-            <a:pPr lvl="4" marL="2160000" indent="-216000">
-              <a:spcBef>
-                <a:spcPts val="283"/>
-              </a:spcBef>
-              <a:buClr>
-                <a:srgbClr val="000000"/>
-              </a:buClr>
-              <a:buSzPct val="45000"/>
-              <a:buFont typeface="Wingdings" charset="2"/>
-              <a:buChar char=""/>
-            </a:pPr>
-            <a:r>
-              <a:rPr b="0" lang="en-US" sz="1800" spc="-1" strike="noStrike">
-                <a:solidFill>
-                  <a:srgbClr val="000000"/>
-                </a:solidFill>
-                <a:latin typeface="Arial"/>
-              </a:rPr>
-              <a:t>Fifth Outline Level</a:t>
-            </a:r>
-            <a:endParaRPr b="0" lang="en-US" sz="1800" spc="-1" strike="noStrike">
-              <a:solidFill>
-                <a:srgbClr val="000000"/>
-              </a:solidFill>
-              <a:latin typeface="Arial"/>
-            </a:endParaRPr>
-          </a:p>
-          <a:p>
-            <a:pPr lvl="5" marL="2592000" indent="-216000">
-              <a:spcBef>
-                <a:spcPts val="283"/>
-              </a:spcBef>
-              <a:buClr>
-                <a:srgbClr val="000000"/>
-              </a:buClr>
-              <a:buSzPct val="45000"/>
-              <a:buFont typeface="Wingdings" charset="2"/>
-              <a:buChar char=""/>
-            </a:pPr>
-            <a:r>
-              <a:rPr b="0" lang="en-US" sz="1800" spc="-1" strike="noStrike">
-                <a:solidFill>
-                  <a:srgbClr val="000000"/>
-                </a:solidFill>
-                <a:latin typeface="Arial"/>
-              </a:rPr>
-              <a:t>Sixth Outline Level</a:t>
-            </a:r>
-            <a:endParaRPr b="0" lang="en-US" sz="1800" spc="-1" strike="noStrike">
-              <a:solidFill>
-                <a:srgbClr val="000000"/>
-              </a:solidFill>
-              <a:latin typeface="Arial"/>
-            </a:endParaRPr>
-          </a:p>
-          <a:p>
-            <a:pPr lvl="6" marL="3024000" indent="-216000">
-              <a:spcBef>
-                <a:spcPts val="283"/>
-              </a:spcBef>
-              <a:buClr>
-                <a:srgbClr val="000000"/>
-              </a:buClr>
-              <a:buSzPct val="45000"/>
-              <a:buFont typeface="Wingdings" charset="2"/>
-              <a:buChar char=""/>
-            </a:pPr>
-            <a:r>
-              <a:rPr b="0" lang="en-US" sz="1800" spc="-1" strike="noStrike">
-                <a:solidFill>
-                  <a:srgbClr val="000000"/>
-                </a:solidFill>
-                <a:latin typeface="Arial"/>
-              </a:rPr>
-              <a:t>Seventh Outline Level</a:t>
-            </a:r>
-            <a:endParaRPr b="0" lang="en-US" sz="1800" spc="-1" strike="noStrike">
-              <a:solidFill>
-                <a:srgbClr val="000000"/>
-              </a:solidFill>
-              <a:latin typeface="Arial"/>
-            </a:endParaRPr>
-          </a:p>
-        </p:txBody>
-      </p:sp>
-      <p:sp>
-        <p:nvSpPr>
-          <p:cNvPr id="43" name="PlaceHolder 3"/>
-          <p:cNvSpPr>
-            <a:spLocks noGrp="1"/>
-          </p:cNvSpPr>
-          <p:nvPr>
             <p:ph type="ftr" idx="4"/>
           </p:nvPr>
         </p:nvSpPr>
         <p:spPr>
           <a:xfrm>
             <a:off x="4038480" y="6356520"/>
-            <a:ext cx="4114080" cy="364320"/>
+            <a:ext cx="4113720" cy="363960"/>
           </a:xfrm>
           <a:prstGeom prst="rect">
             <a:avLst/>
@@ -5937,7 +5668,7 @@
       </p:sp>
       <p:sp>
         <p:nvSpPr>
-          <p:cNvPr id="44" name="PlaceHolder 4"/>
+          <p:cNvPr id="42" name="PlaceHolder 2"/>
           <p:cNvSpPr>
             <a:spLocks noGrp="1"/>
           </p:cNvSpPr>
@@ -5948,7 +5679,7 @@
         <p:spPr>
           <a:xfrm>
             <a:off x="8610480" y="6356520"/>
-            <a:ext cx="2742480" cy="364320"/>
+            <a:ext cx="2742120" cy="363960"/>
           </a:xfrm>
           <a:prstGeom prst="rect">
             <a:avLst/>
@@ -5991,7 +5722,7 @@
                 <a:tab algn="l" pos="0"/>
               </a:tabLst>
             </a:pPr>
-            <a:fld id="{8DC301C7-7E73-4D02-9579-6A5300D40DCA}" type="slidenum">
+            <a:fld id="{055B8777-DF10-4BD3-939B-3D4807AAA629}" type="slidenum">
               <a:rPr b="0" lang="el-GR" sz="1200" spc="-1" strike="noStrike">
                 <a:solidFill>
                   <a:schemeClr val="dk1">
@@ -6013,7 +5744,7 @@
       </p:sp>
       <p:sp>
         <p:nvSpPr>
-          <p:cNvPr id="45" name="PlaceHolder 5"/>
+          <p:cNvPr id="43" name="PlaceHolder 3"/>
           <p:cNvSpPr>
             <a:spLocks noGrp="1"/>
           </p:cNvSpPr>
@@ -6024,7 +5755,7 @@
         <p:spPr>
           <a:xfrm>
             <a:off x="838080" y="6356520"/>
-            <a:ext cx="2742480" cy="364320"/>
+            <a:ext cx="2742120" cy="363960"/>
           </a:xfrm>
           <a:prstGeom prst="rect">
             <a:avLst/>
@@ -6067,6 +5798,280 @@
                 <a:srgbClr val="000000"/>
               </a:solidFill>
               <a:latin typeface="Times New Roman"/>
+            </a:endParaRPr>
+          </a:p>
+        </p:txBody>
+      </p:sp>
+      <p:sp>
+        <p:nvSpPr>
+          <p:cNvPr id="44" name="PlaceHolder 4"/>
+          <p:cNvSpPr>
+            <a:spLocks noGrp="1"/>
+          </p:cNvSpPr>
+          <p:nvPr>
+            <p:ph type="title"/>
+          </p:nvPr>
+        </p:nvSpPr>
+        <p:spPr>
+          <a:xfrm>
+            <a:off x="609480" y="273600"/>
+            <a:ext cx="10972440" cy="1144800"/>
+          </a:xfrm>
+          <a:prstGeom prst="rect">
+            <a:avLst/>
+          </a:prstGeom>
+          <a:noFill/>
+          <a:ln w="0">
+            <a:noFill/>
+          </a:ln>
+        </p:spPr>
+        <p:txBody>
+          <a:bodyPr lIns="0" rIns="0" tIns="0" bIns="0" anchor="ctr">
+            <a:noAutofit/>
+          </a:bodyPr>
+          <a:p>
+            <a:pPr indent="0" algn="ctr">
+              <a:buNone/>
+            </a:pPr>
+            <a:r>
+              <a:rPr b="0" lang="en-US" sz="4400" spc="-1" strike="noStrike">
+                <a:solidFill>
+                  <a:srgbClr val="000000"/>
+                </a:solidFill>
+                <a:latin typeface="Arial"/>
+              </a:rPr>
+              <a:t>Click to edit the title text format</a:t>
+            </a:r>
+            <a:endParaRPr b="0" lang="en-US" sz="4400" spc="-1" strike="noStrike">
+              <a:solidFill>
+                <a:srgbClr val="000000"/>
+              </a:solidFill>
+              <a:latin typeface="Arial"/>
+            </a:endParaRPr>
+          </a:p>
+        </p:txBody>
+      </p:sp>
+      <p:sp>
+        <p:nvSpPr>
+          <p:cNvPr id="45" name="PlaceHolder 5"/>
+          <p:cNvSpPr>
+            <a:spLocks noGrp="1"/>
+          </p:cNvSpPr>
+          <p:nvPr>
+            <p:ph type="body"/>
+          </p:nvPr>
+        </p:nvSpPr>
+        <p:spPr>
+          <a:xfrm>
+            <a:off x="609480" y="1604520"/>
+            <a:ext cx="10972440" cy="3977280"/>
+          </a:xfrm>
+          <a:prstGeom prst="rect">
+            <a:avLst/>
+          </a:prstGeom>
+          <a:noFill/>
+          <a:ln w="0">
+            <a:noFill/>
+          </a:ln>
+        </p:spPr>
+        <p:txBody>
+          <a:bodyPr lIns="0" rIns="0" tIns="0" bIns="0" anchor="t">
+            <a:normAutofit/>
+          </a:bodyPr>
+          <a:p>
+            <a:pPr marL="432000" indent="-324000">
+              <a:spcBef>
+                <a:spcPts val="1417"/>
+              </a:spcBef>
+              <a:buClr>
+                <a:srgbClr val="000000"/>
+              </a:buClr>
+              <a:buSzPct val="45000"/>
+              <a:buFont typeface="Wingdings" charset="2"/>
+              <a:buChar char=""/>
+            </a:pPr>
+            <a:r>
+              <a:rPr b="0" lang="en-US" sz="3200" spc="-1" strike="noStrike">
+                <a:solidFill>
+                  <a:srgbClr val="000000"/>
+                </a:solidFill>
+                <a:latin typeface="Arial"/>
+              </a:rPr>
+              <a:t>Click to edit the outline text format</a:t>
+            </a:r>
+            <a:endParaRPr b="0" lang="en-US" sz="3200" spc="-1" strike="noStrike">
+              <a:solidFill>
+                <a:srgbClr val="000000"/>
+              </a:solidFill>
+              <a:latin typeface="Arial"/>
+            </a:endParaRPr>
+          </a:p>
+          <a:p>
+            <a:pPr lvl="1" marL="864000" indent="-324000">
+              <a:spcBef>
+                <a:spcPts val="1134"/>
+              </a:spcBef>
+              <a:buClr>
+                <a:srgbClr val="000000"/>
+              </a:buClr>
+              <a:buSzPct val="75000"/>
+              <a:buFont typeface="Symbol" charset="2"/>
+              <a:buChar char=""/>
+            </a:pPr>
+            <a:r>
+              <a:rPr b="0" lang="en-US" sz="2800" spc="-1" strike="noStrike">
+                <a:solidFill>
+                  <a:srgbClr val="000000"/>
+                </a:solidFill>
+                <a:latin typeface="Arial"/>
+              </a:rPr>
+              <a:t>Second Outline Level</a:t>
+            </a:r>
+            <a:endParaRPr b="0" lang="en-US" sz="2800" spc="-1" strike="noStrike">
+              <a:solidFill>
+                <a:srgbClr val="000000"/>
+              </a:solidFill>
+              <a:latin typeface="Arial"/>
+            </a:endParaRPr>
+          </a:p>
+          <a:p>
+            <a:pPr lvl="2" marL="1296000" indent="-288000">
+              <a:spcBef>
+                <a:spcPts val="850"/>
+              </a:spcBef>
+              <a:buClr>
+                <a:srgbClr val="000000"/>
+              </a:buClr>
+              <a:buSzPct val="45000"/>
+              <a:buFont typeface="Wingdings" charset="2"/>
+              <a:buChar char=""/>
+            </a:pPr>
+            <a:r>
+              <a:rPr b="0" lang="en-US" sz="2400" spc="-1" strike="noStrike">
+                <a:solidFill>
+                  <a:srgbClr val="000000"/>
+                </a:solidFill>
+                <a:latin typeface="Arial"/>
+              </a:rPr>
+              <a:t>Third Outline Level</a:t>
+            </a:r>
+            <a:endParaRPr b="0" lang="en-US" sz="2400" spc="-1" strike="noStrike">
+              <a:solidFill>
+                <a:srgbClr val="000000"/>
+              </a:solidFill>
+              <a:latin typeface="Arial"/>
+            </a:endParaRPr>
+          </a:p>
+          <a:p>
+            <a:pPr lvl="3" marL="1728000" indent="-216000">
+              <a:spcBef>
+                <a:spcPts val="567"/>
+              </a:spcBef>
+              <a:buClr>
+                <a:srgbClr val="000000"/>
+              </a:buClr>
+              <a:buSzPct val="75000"/>
+              <a:buFont typeface="Symbol" charset="2"/>
+              <a:buChar char=""/>
+            </a:pPr>
+            <a:r>
+              <a:rPr b="0" lang="en-US" sz="2000" spc="-1" strike="noStrike">
+                <a:solidFill>
+                  <a:srgbClr val="000000"/>
+                </a:solidFill>
+                <a:latin typeface="Arial"/>
+              </a:rPr>
+              <a:t>Fourth Outline Level</a:t>
+            </a:r>
+            <a:endParaRPr b="0" lang="en-US" sz="2000" spc="-1" strike="noStrike">
+              <a:solidFill>
+                <a:srgbClr val="000000"/>
+              </a:solidFill>
+              <a:latin typeface="Arial"/>
+            </a:endParaRPr>
+          </a:p>
+          <a:p>
+            <a:pPr lvl="4" marL="2160000" indent="-216000">
+              <a:spcBef>
+                <a:spcPts val="283"/>
+              </a:spcBef>
+              <a:buClr>
+                <a:srgbClr val="000000"/>
+              </a:buClr>
+              <a:buSzPct val="45000"/>
+              <a:buFont typeface="Wingdings" charset="2"/>
+              <a:buChar char=""/>
+            </a:pPr>
+            <a:r>
+              <a:rPr b="0" lang="en-US" sz="2000" spc="-1" strike="noStrike">
+                <a:solidFill>
+                  <a:srgbClr val="000000"/>
+                </a:solidFill>
+                <a:latin typeface="Arial"/>
+              </a:rPr>
+              <a:t>Fifth Outline Level</a:t>
+            </a:r>
+            <a:endParaRPr b="0" lang="en-US" sz="2000" spc="-1" strike="noStrike">
+              <a:solidFill>
+                <a:srgbClr val="000000"/>
+              </a:solidFill>
+              <a:latin typeface="Arial"/>
+            </a:endParaRPr>
+          </a:p>
+          <a:p>
+            <a:pPr lvl="5" marL="2592000" indent="-216000">
+              <a:spcBef>
+                <a:spcPts val="283"/>
+              </a:spcBef>
+              <a:buClr>
+                <a:srgbClr val="000000"/>
+              </a:buClr>
+              <a:buSzPct val="45000"/>
+              <a:buFont typeface="Wingdings" charset="2"/>
+              <a:buChar char=""/>
+            </a:pPr>
+            <a:r>
+              <a:rPr b="0" lang="en-US" sz="2000" spc="-1" strike="noStrike">
+                <a:solidFill>
+                  <a:srgbClr val="000000"/>
+                </a:solidFill>
+                <a:latin typeface="Arial"/>
+              </a:rPr>
+              <a:t>Sixth Outline Level</a:t>
+            </a:r>
+            <a:endParaRPr b="0" lang="en-US" sz="2000" spc="-1" strike="noStrike">
+              <a:solidFill>
+                <a:srgbClr val="000000"/>
+              </a:solidFill>
+              <a:latin typeface="Arial"/>
+            </a:endParaRPr>
+          </a:p>
+          <a:p>
+            <a:pPr lvl="6" marL="3024000" indent="-216000">
+              <a:spcBef>
+                <a:spcPts val="283"/>
+              </a:spcBef>
+              <a:buClr>
+                <a:srgbClr val="000000"/>
+              </a:buClr>
+              <a:buSzPct val="45000"/>
+              <a:buFont typeface="Wingdings" charset="2"/>
+              <a:buChar char=""/>
+            </a:pPr>
+            <a:r>
+              <a:rPr b="0" lang="en-US" sz="2000" spc="-1" strike="noStrike">
+                <a:solidFill>
+                  <a:srgbClr val="000000"/>
+                </a:solidFill>
+                <a:latin typeface="Arial"/>
+              </a:rPr>
+              <a:t>Seventh Outline Level</a:t>
+            </a:r>
+            <a:endParaRPr b="0" lang="en-US" sz="2000" spc="-1" strike="noStrike">
+              <a:solidFill>
+                <a:srgbClr val="000000"/>
+              </a:solidFill>
+              <a:latin typeface="Arial"/>
             </a:endParaRPr>
           </a:p>
         </p:txBody>
@@ -6121,7 +6126,7 @@
         <p:spPr>
           <a:xfrm>
             <a:off x="1523880" y="1122480"/>
-            <a:ext cx="9143280" cy="2386800"/>
+            <a:ext cx="9142920" cy="2386440"/>
           </a:xfrm>
           <a:prstGeom prst="rect">
             <a:avLst/>
@@ -6188,7 +6193,7 @@
         <p:spPr>
           <a:xfrm>
             <a:off x="1523880" y="3831120"/>
-            <a:ext cx="9143280" cy="1654920"/>
+            <a:ext cx="9142920" cy="1654560"/>
           </a:xfrm>
           <a:prstGeom prst="rect">
             <a:avLst/>
@@ -6334,7 +6339,7 @@
       </p:grpSpPr>
       <p:sp>
         <p:nvSpPr>
-          <p:cNvPr id="100" name="PlaceHolder 1"/>
+          <p:cNvPr id="111" name="PlaceHolder 1"/>
           <p:cNvSpPr>
             <a:spLocks noGrp="1"/>
           </p:cNvSpPr>
@@ -6344,8 +6349,8 @@
         </p:nvSpPr>
         <p:spPr>
           <a:xfrm>
-            <a:off x="914760" y="168840"/>
-            <a:ext cx="9143280" cy="825840"/>
+            <a:off x="625320" y="54720"/>
+            <a:ext cx="10972440" cy="804240"/>
           </a:xfrm>
           <a:prstGeom prst="rect">
             <a:avLst/>
@@ -6360,23 +6365,17 @@
             <a:noAutofit/>
           </a:bodyPr>
           <a:p>
-            <a:pPr indent="0">
-              <a:lnSpc>
-                <a:spcPct val="100000"/>
-              </a:lnSpc>
-              <a:buNone/>
-              <a:tabLst>
-                <a:tab algn="l" pos="0"/>
-              </a:tabLst>
-            </a:pPr>
-            <a:r>
-              <a:rPr b="0" lang="el-GR" sz="2800" spc="-1" strike="noStrike">
+            <a:pPr indent="0" algn="ctr">
+              <a:buNone/>
+            </a:pPr>
+            <a:r>
+              <a:rPr b="0" lang="en-US" sz="2800" spc="-1" strike="noStrike">
                 <a:solidFill>
-                  <a:schemeClr val="dk1"/>
+                  <a:srgbClr val="000000"/>
                 </a:solidFill>
-                <a:latin typeface="Calibri"/>
+                <a:latin typeface="Arial"/>
               </a:rPr>
-              <a:t>Reduction rate σακχάρων στο κινητικό πείραμα</a:t>
+              <a:t>Μεταβολικά μονοπάτια που ακολουθούνται III</a:t>
             </a:r>
             <a:endParaRPr b="0" lang="en-US" sz="2800" spc="-1" strike="noStrike">
               <a:solidFill>
@@ -6389,7 +6388,7 @@
       </p:sp>
       <p:pic>
         <p:nvPicPr>
-          <p:cNvPr id="101" name="" descr=""/>
+          <p:cNvPr id="112" name="" descr=""/>
           <p:cNvPicPr/>
           <p:nvPr/>
         </p:nvPicPr>
@@ -6399,8 +6398,8 @@
         </p:blipFill>
         <p:spPr>
           <a:xfrm>
-            <a:off x="2514600" y="994680"/>
-            <a:ext cx="7892280" cy="5261400"/>
+            <a:off x="531000" y="643320"/>
+            <a:ext cx="10600920" cy="5963040"/>
           </a:xfrm>
           <a:prstGeom prst="rect">
             <a:avLst/>
@@ -6410,6 +6409,65 @@
           </a:ln>
         </p:spPr>
       </p:pic>
+      <p:sp>
+        <p:nvSpPr>
+          <p:cNvPr id="113" name=""/>
+          <p:cNvSpPr txBox="1"/>
+          <p:nvPr/>
+        </p:nvSpPr>
+        <p:spPr>
+          <a:xfrm>
+            <a:off x="7963560" y="3903840"/>
+            <a:ext cx="3247560" cy="2685600"/>
+          </a:xfrm>
+          <a:prstGeom prst="rect">
+            <a:avLst/>
+          </a:prstGeom>
+          <a:noFill/>
+          <a:ln w="0">
+            <a:noFill/>
+          </a:ln>
+        </p:spPr>
+        <p:txBody>
+          <a:bodyPr lIns="90000" rIns="90000" tIns="45000" bIns="45000" anchor="t">
+            <a:noAutofit/>
+          </a:bodyPr>
+          <a:p>
+            <a:r>
+              <a:rPr b="0" lang="en-US" sz="1800" spc="-1" strike="noStrike">
+                <a:solidFill>
+                  <a:srgbClr val="000000"/>
+                </a:solidFill>
+                <a:latin typeface="Arial"/>
+              </a:rPr>
+              <a:t>Το ότι αυτά τα ισοζύγια βγαίνουν χωρίς να υποεκτιμάται καμία τιμή σημαίνει και ότι τα συνολικά σάκχαρα δεν αυξάνονται</a:t>
+            </a:r>
+            <a:endParaRPr b="0" lang="en-US" sz="1800" spc="-1" strike="noStrike">
+              <a:solidFill>
+                <a:srgbClr val="000000"/>
+              </a:solidFill>
+              <a:latin typeface="Arial"/>
+            </a:endParaRPr>
+          </a:p>
+          <a:p>
+            <a:r>
+              <a:rPr b="0" lang="en-US" sz="1800" spc="-1" strike="noStrike">
+                <a:solidFill>
+                  <a:srgbClr val="000000"/>
+                </a:solidFill>
+                <a:latin typeface="Arial"/>
+              </a:rPr>
+              <a:t>(άρα πιθανόν δεν γίνεται καν υδρόλυση πέρα από αυτήν της σακχαρόζης).</a:t>
+            </a:r>
+            <a:endParaRPr b="0" lang="en-US" sz="1800" spc="-1" strike="noStrike">
+              <a:solidFill>
+                <a:srgbClr val="000000"/>
+              </a:solidFill>
+              <a:latin typeface="Arial"/>
+            </a:endParaRPr>
+          </a:p>
+        </p:txBody>
+      </p:sp>
     </p:spTree>
   </p:cSld>
   <mc:AlternateContent>
@@ -6442,7 +6500,7 @@
       </p:grpSpPr>
       <p:sp>
         <p:nvSpPr>
-          <p:cNvPr id="102" name="PlaceHolder 1"/>
+          <p:cNvPr id="114" name="PlaceHolder 1"/>
           <p:cNvSpPr>
             <a:spLocks noGrp="1"/>
           </p:cNvSpPr>
@@ -6452,8 +6510,8 @@
         </p:nvSpPr>
         <p:spPr>
           <a:xfrm>
-            <a:off x="457200" y="228600"/>
-            <a:ext cx="9143280" cy="705960"/>
+            <a:off x="914760" y="168840"/>
+            <a:ext cx="9142920" cy="825480"/>
           </a:xfrm>
           <a:prstGeom prst="rect">
             <a:avLst/>
@@ -6484,7 +6542,19 @@
                 </a:solidFill>
                 <a:latin typeface="Calibri"/>
               </a:rPr>
-              <a:t>Συγκριτικά Διαγράμματα με βάση την θερμοκρασία</a:t>
+              <a:t>Υπενθύμιση αποτελεσμάτων του κινητικού πειράματος</a:t>
+            </a:r>
+            <a:br>
+              <a:rPr sz="2800"/>
+            </a:br>
+            <a:r>
+              <a:rPr b="0" lang="el-GR" sz="2800" spc="-1" strike="noStrike">
+                <a:solidFill>
+                  <a:schemeClr val="dk1"/>
+                </a:solidFill>
+                <a:latin typeface="Calibri"/>
+              </a:rPr>
+              <a:t>(45 C θερμοκρασία, 2 mL mix, 2 επαναλήψεις)</a:t>
             </a:r>
             <a:endParaRPr b="0" lang="en-US" sz="2800" spc="-1" strike="noStrike">
               <a:solidFill>
@@ -6497,7 +6567,7 @@
       </p:sp>
       <p:pic>
         <p:nvPicPr>
-          <p:cNvPr id="103" name="" descr=""/>
+          <p:cNvPr id="115" name="" descr=""/>
           <p:cNvPicPr/>
           <p:nvPr/>
         </p:nvPicPr>
@@ -6507,8 +6577,8 @@
         </p:blipFill>
         <p:spPr>
           <a:xfrm>
-            <a:off x="1600200" y="914400"/>
-            <a:ext cx="8749080" cy="5832720"/>
+            <a:off x="1766520" y="1143000"/>
+            <a:ext cx="8291520" cy="5527440"/>
           </a:xfrm>
           <a:prstGeom prst="rect">
             <a:avLst/>
@@ -6550,7 +6620,7 @@
       </p:grpSpPr>
       <p:sp>
         <p:nvSpPr>
-          <p:cNvPr id="104" name="PlaceHolder 1"/>
+          <p:cNvPr id="116" name="PlaceHolder 1"/>
           <p:cNvSpPr>
             <a:spLocks noGrp="1"/>
           </p:cNvSpPr>
@@ -6560,8 +6630,8 @@
         </p:nvSpPr>
         <p:spPr>
           <a:xfrm>
-            <a:off x="457200" y="228600"/>
-            <a:ext cx="9143280" cy="705960"/>
+            <a:off x="914760" y="168840"/>
+            <a:ext cx="9142920" cy="825480"/>
           </a:xfrm>
           <a:prstGeom prst="rect">
             <a:avLst/>
@@ -6592,7 +6662,7 @@
                 </a:solidFill>
                 <a:latin typeface="Calibri"/>
               </a:rPr>
-              <a:t>Reduction Rate Σακχάρων – Σύγκριση Θερμοκρασιών</a:t>
+              <a:t>Reduction rate σακχάρων στο κινητικό πείραμα</a:t>
             </a:r>
             <a:endParaRPr b="0" lang="en-US" sz="2800" spc="-1" strike="noStrike">
               <a:solidFill>
@@ -6605,7 +6675,7 @@
       </p:sp>
       <p:pic>
         <p:nvPicPr>
-          <p:cNvPr id="105" name="" descr=""/>
+          <p:cNvPr id="117" name="" descr=""/>
           <p:cNvPicPr/>
           <p:nvPr/>
         </p:nvPicPr>
@@ -6615,8 +6685,8 @@
         </p:blipFill>
         <p:spPr>
           <a:xfrm>
-            <a:off x="2293920" y="934560"/>
-            <a:ext cx="8120880" cy="5413680"/>
+            <a:off x="2514600" y="994680"/>
+            <a:ext cx="7891920" cy="5261040"/>
           </a:xfrm>
           <a:prstGeom prst="rect">
             <a:avLst/>
@@ -6658,7 +6728,7 @@
       </p:grpSpPr>
       <p:sp>
         <p:nvSpPr>
-          <p:cNvPr id="106" name="PlaceHolder 1"/>
+          <p:cNvPr id="118" name="PlaceHolder 1"/>
           <p:cNvSpPr>
             <a:spLocks noGrp="1"/>
           </p:cNvSpPr>
@@ -6668,8 +6738,8 @@
         </p:nvSpPr>
         <p:spPr>
           <a:xfrm>
-            <a:off x="1371960" y="108000"/>
-            <a:ext cx="9600480" cy="825840"/>
+            <a:off x="914760" y="168840"/>
+            <a:ext cx="9142920" cy="825480"/>
           </a:xfrm>
           <a:prstGeom prst="rect">
             <a:avLst/>
@@ -6700,7 +6770,7 @@
                 </a:solidFill>
                 <a:latin typeface="Calibri"/>
               </a:rPr>
-              <a:t>Συμπεράσματα – Κατανάλωση σακχάρων, pH, Αγωγιμότητα</a:t>
+              <a:t>Συσχέτιση COD-HPLC</a:t>
             </a:r>
             <a:endParaRPr b="0" lang="en-US" sz="2800" spc="-1" strike="noStrike">
               <a:solidFill>
@@ -6711,182 +6781,63 @@
           </a:p>
         </p:txBody>
       </p:sp>
-      <p:sp>
-        <p:nvSpPr>
-          <p:cNvPr id="107" name="PlaceHolder 2"/>
-          <p:cNvSpPr>
-            <a:spLocks noGrp="1"/>
-          </p:cNvSpPr>
-          <p:nvPr>
-            <p:ph/>
-          </p:nvPr>
-        </p:nvSpPr>
-        <p:spPr>
-          <a:xfrm>
-            <a:off x="457560" y="1051920"/>
-            <a:ext cx="10972080" cy="5119920"/>
-          </a:xfrm>
-          <a:prstGeom prst="rect">
-            <a:avLst/>
-          </a:prstGeom>
-          <a:noFill/>
-          <a:ln w="0">
-            <a:noFill/>
-          </a:ln>
-        </p:spPr>
-        <p:txBody>
-          <a:bodyPr lIns="0" rIns="0" tIns="0" bIns="0" anchor="t">
-            <a:normAutofit fontScale="83888"/>
-          </a:bodyPr>
-          <a:p>
-            <a:pPr marL="432000" indent="-324000">
-              <a:lnSpc>
-                <a:spcPct val="90000"/>
-              </a:lnSpc>
-              <a:spcBef>
-                <a:spcPts val="1100"/>
-              </a:spcBef>
-              <a:buClr>
-                <a:srgbClr val="000000"/>
-              </a:buClr>
-              <a:buSzPct val="45000"/>
-              <a:buFont typeface="Wingdings" charset="2"/>
-              <a:buChar char=""/>
-            </a:pPr>
-            <a:r>
-              <a:rPr b="0" lang="el-GR" sz="2400" spc="-1" strike="noStrike">
+      <p:pic>
+        <p:nvPicPr>
+          <p:cNvPr id="119" name="" descr=""/>
+          <p:cNvPicPr/>
+          <p:nvPr/>
+        </p:nvPicPr>
+        <p:blipFill>
+          <a:blip r:embed="rId1"/>
+          <a:stretch/>
+        </p:blipFill>
+        <p:spPr>
+          <a:xfrm>
+            <a:off x="273240" y="936720"/>
+            <a:ext cx="7272360" cy="4848120"/>
+          </a:xfrm>
+          <a:prstGeom prst="rect">
+            <a:avLst/>
+          </a:prstGeom>
+          <a:ln w="0">
+            <a:noFill/>
+          </a:ln>
+        </p:spPr>
+      </p:pic>
+      <p:sp>
+        <p:nvSpPr>
+          <p:cNvPr id="120" name=""/>
+          <p:cNvSpPr txBox="1"/>
+          <p:nvPr/>
+        </p:nvSpPr>
+        <p:spPr>
+          <a:xfrm>
+            <a:off x="7760520" y="1748880"/>
+            <a:ext cx="4215960" cy="2943360"/>
+          </a:xfrm>
+          <a:prstGeom prst="rect">
+            <a:avLst/>
+          </a:prstGeom>
+          <a:noFill/>
+          <a:ln w="0">
+            <a:noFill/>
+          </a:ln>
+        </p:spPr>
+        <p:txBody>
+          <a:bodyPr lIns="90000" rIns="90000" tIns="45000" bIns="45000" anchor="t">
+            <a:noAutofit/>
+          </a:bodyPr>
+          <a:p>
+            <a:r>
+              <a:rPr b="0" lang="en-US" sz="1800" spc="-1" strike="noStrike">
                 <a:solidFill>
-                  <a:schemeClr val="dk1"/>
+                  <a:srgbClr val="000000"/>
                 </a:solidFill>
-                <a:latin typeface="Calibri"/>
+                <a:latin typeface="Arial"/>
               </a:rPr>
-              <a:t>Η γλυκόζη τελειώνει πολύ κοντά στις 24 ώρες πειράματος και στις δύο θερμοκρασίες. Για θερμοκρασία 35 C το όργανο μετράει γλυκόζη σε όλα τα πειράματα στις 24 ώρες, αλλά η καμπύλη μας βγάζει ότι αυτή η συγκέντρωση είναι αρνητική (άρα είναι πολύ κοντά στο 0). Μόνη εξαίρεση αποτελεί το πείραμα με 8 mL, όπου το οργάνο δεν μπορεί να ανιχνεύσει γλυκόζη στις 24 ώρες άρα τελείωσε νωρίτερα. Στους 45 C, στη μία επανάληψη η γλυκόζη έχει τελειώσει στις 24 ώρες και στην άλλη στις 26 ώρες περίπου.</a:t>
-            </a:r>
-            <a:endParaRPr b="0" lang="en-US" sz="2400" spc="-1" strike="noStrike">
-              <a:solidFill>
-                <a:srgbClr val="000000"/>
-              </a:solidFill>
-              <a:latin typeface="Arial"/>
-            </a:endParaRPr>
-          </a:p>
-          <a:p>
-            <a:pPr marL="432000" indent="-324000">
-              <a:lnSpc>
-                <a:spcPct val="90000"/>
-              </a:lnSpc>
-              <a:spcBef>
-                <a:spcPts val="1100"/>
-              </a:spcBef>
-              <a:buClr>
-                <a:srgbClr val="000000"/>
-              </a:buClr>
-              <a:buSzPct val="45000"/>
-              <a:buFont typeface="Wingdings" charset="2"/>
-              <a:buChar char=""/>
-            </a:pPr>
-            <a:r>
-              <a:rPr b="0" lang="el-GR" sz="2400" spc="-1" strike="noStrike">
-                <a:solidFill>
-                  <a:schemeClr val="dk1"/>
-                </a:solidFill>
-                <a:latin typeface="Calibri"/>
-              </a:rPr>
-              <a:t>Η σακχαρόζη τελειώνει μετά τις 24 ώρες, αλλά μέχρι τότε έχει καταναλωθεί ένα σημαντικό ποσόστο.</a:t>
-            </a:r>
-            <a:endParaRPr b="0" lang="en-US" sz="2400" spc="-1" strike="noStrike">
-              <a:solidFill>
-                <a:srgbClr val="000000"/>
-              </a:solidFill>
-              <a:latin typeface="Arial"/>
-            </a:endParaRPr>
-          </a:p>
-          <a:p>
-            <a:pPr marL="432000" indent="-324000">
-              <a:lnSpc>
-                <a:spcPct val="90000"/>
-              </a:lnSpc>
-              <a:spcBef>
-                <a:spcPts val="1100"/>
-              </a:spcBef>
-              <a:buClr>
-                <a:srgbClr val="000000"/>
-              </a:buClr>
-              <a:buSzPct val="45000"/>
-              <a:buFont typeface="Wingdings" charset="2"/>
-              <a:buChar char=""/>
-            </a:pPr>
-            <a:r>
-              <a:rPr b="0" lang="el-GR" sz="2400" spc="-1" strike="noStrike">
-                <a:solidFill>
-                  <a:schemeClr val="dk1"/>
-                </a:solidFill>
-                <a:latin typeface="Calibri"/>
-              </a:rPr>
-              <a:t>Η φρουκτόζη μπορεί να καταναλωθεί πλήρως στους 35 C αλλά πιο αργά από τα άλλα σάκχαρα (στις 72 h η συγκέντρωση ήταν κοντά στο 0). Στους 45 C, καταναλώνεται και πάλι με αργό ρυθμό, αλλά ακόμη και σε 171 h δεν καταναλώθηκε πλήρως αλλά μόνο περίπου κατά τα 2/3. Αυτό ίσως σημαίνει ότι οι μικροοργανισμοί που μπορούν να την μεταβολίσουν είναι μεσόφιλοι. </a:t>
-            </a:r>
-            <a:endParaRPr b="0" lang="en-US" sz="2400" spc="-1" strike="noStrike">
-              <a:solidFill>
-                <a:srgbClr val="000000"/>
-              </a:solidFill>
-              <a:latin typeface="Arial"/>
-            </a:endParaRPr>
-          </a:p>
-          <a:p>
-            <a:pPr marL="432000" indent="-324000">
-              <a:lnSpc>
-                <a:spcPct val="90000"/>
-              </a:lnSpc>
-              <a:spcBef>
-                <a:spcPts val="1100"/>
-              </a:spcBef>
-              <a:buClr>
-                <a:srgbClr val="000000"/>
-              </a:buClr>
-              <a:buSzPct val="45000"/>
-              <a:buFont typeface="Wingdings" charset="2"/>
-              <a:buChar char=""/>
-            </a:pPr>
-            <a:r>
-              <a:rPr b="0" lang="el-GR" sz="2400" spc="-1" strike="noStrike">
-                <a:solidFill>
-                  <a:schemeClr val="dk1"/>
-                </a:solidFill>
-                <a:latin typeface="Calibri"/>
-              </a:rPr>
-              <a:t>Το pH έχει μία μικρή μείωση κατά τις πρώτες 48 ώρες, αλλά μετά αρχίζουν να παράγονται περισσότερα οξέα και μειώνεται σημαντικά.</a:t>
-            </a:r>
-            <a:endParaRPr b="0" lang="en-US" sz="2400" spc="-1" strike="noStrike">
-              <a:solidFill>
-                <a:srgbClr val="000000"/>
-              </a:solidFill>
-              <a:latin typeface="Arial"/>
-            </a:endParaRPr>
-          </a:p>
-          <a:p>
-            <a:pPr marL="432000" indent="-324000">
-              <a:lnSpc>
-                <a:spcPct val="90000"/>
-              </a:lnSpc>
-              <a:spcBef>
-                <a:spcPts val="1100"/>
-              </a:spcBef>
-              <a:buClr>
-                <a:srgbClr val="000000"/>
-              </a:buClr>
-              <a:buSzPct val="45000"/>
-              <a:buFont typeface="Wingdings" charset="2"/>
-              <a:buChar char=""/>
-            </a:pPr>
-            <a:r>
-              <a:rPr b="0" lang="el-GR" sz="2400" spc="-1" strike="noStrike">
-                <a:solidFill>
-                  <a:schemeClr val="dk1"/>
-                </a:solidFill>
-                <a:latin typeface="Calibri"/>
-              </a:rPr>
-              <a:t>Η ηλεκτρική αγωγιμότητα έχει μία μικρή αύξηση κατά την διάρκεια του πειράματος</a:t>
-            </a:r>
-            <a:endParaRPr b="0" lang="en-US" sz="2400" spc="-1" strike="noStrike">
+              <a:t>Αξίζει να σημειωθεί πως στο πείραμα αυτό είχε γίνει αραίωση 1:50 και κάποιες τιμές απορρόφησης ήταν σχετικά κοντά σε αυτήν του blank, οπότε αναμενόταν πως το σφάλμα είναι αρκετά μεγάλο και το βασικό συμπέρασμα αυτών των διαγραμμάτων είναι ακριβώς αυτό. Το COD δεν θεωρείται αρκετά αξιόπιστο για να βγούν συμπεράσματα όπως του άλλου πειράματος. </a:t>
+            </a:r>
+            <a:endParaRPr b="0" lang="en-US" sz="1800" spc="-1" strike="noStrike">
               <a:solidFill>
                 <a:srgbClr val="000000"/>
               </a:solidFill>
@@ -6927,7 +6878,7 @@
       </p:grpSpPr>
       <p:sp>
         <p:nvSpPr>
-          <p:cNvPr id="108" name="PlaceHolder 1"/>
+          <p:cNvPr id="121" name="PlaceHolder 1"/>
           <p:cNvSpPr>
             <a:spLocks noGrp="1"/>
           </p:cNvSpPr>
@@ -6937,8 +6888,8 @@
         </p:nvSpPr>
         <p:spPr>
           <a:xfrm>
-            <a:off x="1372320" y="-140040"/>
-            <a:ext cx="9600480" cy="825840"/>
+            <a:off x="457200" y="228600"/>
+            <a:ext cx="9142920" cy="705600"/>
           </a:xfrm>
           <a:prstGeom prst="rect">
             <a:avLst/>
@@ -6969,7 +6920,7 @@
                 </a:solidFill>
                 <a:latin typeface="Calibri"/>
               </a:rPr>
-              <a:t>Συμπεράσματα – Προιόντα</a:t>
+              <a:t>Συγκριτικά Διαγράμματα με βάση την θερμοκρασία</a:t>
             </a:r>
             <a:endParaRPr b="0" lang="en-US" sz="2800" spc="-1" strike="noStrike">
               <a:solidFill>
@@ -6980,176 +6931,29 @@
           </a:p>
         </p:txBody>
       </p:sp>
-      <p:sp>
-        <p:nvSpPr>
-          <p:cNvPr id="109" name="PlaceHolder 2"/>
-          <p:cNvSpPr>
-            <a:spLocks noGrp="1"/>
-          </p:cNvSpPr>
-          <p:nvPr>
-            <p:ph/>
-          </p:nvPr>
-        </p:nvSpPr>
-        <p:spPr>
-          <a:xfrm>
-            <a:off x="457920" y="685800"/>
-            <a:ext cx="10972080" cy="5943600"/>
-          </a:xfrm>
-          <a:prstGeom prst="rect">
-            <a:avLst/>
-          </a:prstGeom>
-          <a:noFill/>
-          <a:ln w="0">
-            <a:noFill/>
-          </a:ln>
-        </p:spPr>
-        <p:txBody>
-          <a:bodyPr lIns="0" rIns="0" tIns="0" bIns="0" anchor="t">
-            <a:normAutofit fontScale="96666"/>
-          </a:bodyPr>
-          <a:p>
-            <a:pPr marL="432000" indent="-324000">
-              <a:lnSpc>
-                <a:spcPct val="90000"/>
-              </a:lnSpc>
-              <a:spcBef>
-                <a:spcPts val="1100"/>
-              </a:spcBef>
-              <a:buClr>
-                <a:srgbClr val="000000"/>
-              </a:buClr>
-              <a:buSzPct val="45000"/>
-              <a:buFont typeface="Wingdings" charset="2"/>
-              <a:buChar char=""/>
-            </a:pPr>
-            <a:r>
-              <a:rPr b="0" lang="el-GR" sz="2400" spc="-1" strike="noStrike">
-                <a:solidFill>
-                  <a:schemeClr val="dk1"/>
-                </a:solidFill>
-                <a:latin typeface="Calibri"/>
-              </a:rPr>
-              <a:t>Η προσθήκη 1 ml mix διαφοροποιήθηκε σχετικά λίγο από το 0 ml που σημαίνει ότι μάλλον χρειάζεται περισσότερη ποσότητα για να γίνει αισθητή η ύπαρξη τους. Επίσης οι ποσότητες 4 και 8 mL φάνηκε να έχουν αμελητέα ή και αρνητική επίδραση στο σύστημα σε σχέση με το 2 ml.</a:t>
-            </a:r>
-            <a:endParaRPr b="0" lang="en-US" sz="2400" spc="-1" strike="noStrike">
-              <a:solidFill>
-                <a:srgbClr val="000000"/>
-              </a:solidFill>
-              <a:latin typeface="Arial"/>
-            </a:endParaRPr>
-          </a:p>
-          <a:p>
-            <a:pPr marL="432000" indent="-324000">
-              <a:lnSpc>
-                <a:spcPct val="90000"/>
-              </a:lnSpc>
-              <a:spcBef>
-                <a:spcPts val="1100"/>
-              </a:spcBef>
-              <a:buClr>
-                <a:srgbClr val="000000"/>
-              </a:buClr>
-              <a:buSzPct val="45000"/>
-              <a:buFont typeface="Wingdings" charset="2"/>
-              <a:buChar char=""/>
-            </a:pPr>
-            <a:r>
-              <a:rPr b="0" lang="el-GR" sz="2400" spc="-1" strike="noStrike">
-                <a:solidFill>
-                  <a:schemeClr val="dk1"/>
-                </a:solidFill>
-                <a:latin typeface="Calibri"/>
-              </a:rPr>
-              <a:t>Βασικότερο προιόν της γλυκόζης αποτελεί η αιθανόλη καθώς παρατηρείται μία μεγάλη αύξηση της στο 24ωρο. Οι μικροοργανισμοί που κάνουν την μετατροπή αυτή είναι μεσόφιλοι καθώς στους 35 C γίνεται καλύτερα. Βέβαια, στις 48 ώρες παρατηρείται αύξηση και των οξέων χωρίς να μειωθεί σημαντικά κάποια ένωση, οπότε το μονοπάτι που ακολουθείται παράγει αιθανόλη με ένα συμπροιόν (είτε γαλακτικό ή οξικό οξύ).</a:t>
-            </a:r>
-            <a:endParaRPr b="0" lang="en-US" sz="2400" spc="-1" strike="noStrike">
-              <a:solidFill>
-                <a:srgbClr val="000000"/>
-              </a:solidFill>
-              <a:latin typeface="Arial"/>
-            </a:endParaRPr>
-          </a:p>
-          <a:p>
-            <a:pPr marL="432000" indent="-324000">
-              <a:lnSpc>
-                <a:spcPct val="90000"/>
-              </a:lnSpc>
-              <a:spcBef>
-                <a:spcPts val="1100"/>
-              </a:spcBef>
-              <a:buClr>
-                <a:srgbClr val="000000"/>
-              </a:buClr>
-              <a:buSzPct val="45000"/>
-              <a:buFont typeface="Wingdings" charset="2"/>
-              <a:buChar char=""/>
-            </a:pPr>
-            <a:r>
-              <a:rPr b="0" lang="el-GR" sz="2400" spc="-1" strike="noStrike">
-                <a:solidFill>
-                  <a:schemeClr val="dk1"/>
-                </a:solidFill>
-                <a:latin typeface="Calibri"/>
-              </a:rPr>
-              <a:t>Το προπιονικό οξύ είναι το λιγότερο ευαίσθητο προιόν στις μεταβολές της ποσότητας του μιξ αλλά και της θερμοκρασίας. Παράγεται μάλλον από αναγωγή μίας ποσότητας του γαλακτικού οξέος που παράγεται.</a:t>
-            </a:r>
-            <a:endParaRPr b="0" lang="en-US" sz="2400" spc="-1" strike="noStrike">
-              <a:solidFill>
-                <a:srgbClr val="000000"/>
-              </a:solidFill>
-              <a:latin typeface="Arial"/>
-            </a:endParaRPr>
-          </a:p>
-          <a:p>
-            <a:pPr marL="432000" indent="-324000">
-              <a:lnSpc>
-                <a:spcPct val="90000"/>
-              </a:lnSpc>
-              <a:spcBef>
-                <a:spcPts val="1100"/>
-              </a:spcBef>
-              <a:buClr>
-                <a:srgbClr val="000000"/>
-              </a:buClr>
-              <a:buSzPct val="45000"/>
-              <a:buFont typeface="Wingdings" charset="2"/>
-              <a:buChar char=""/>
-            </a:pPr>
-            <a:r>
-              <a:rPr b="0" lang="el-GR" sz="2400" spc="-1" strike="noStrike">
-                <a:solidFill>
-                  <a:schemeClr val="dk1"/>
-                </a:solidFill>
-                <a:latin typeface="Calibri"/>
-              </a:rPr>
-              <a:t>Οι μικροοργανισμοί που υπάρχουν στα food waste μπορούν να παράξουν κάθε ένα από τα προιόντα που μετράμε, οπότε οι μικροοργανισμοί του μιξ φαίνεται να αλλάζουν μόνο τους ρυθμούς παραγωγής και όχι το προφίλ προιόντων.</a:t>
-            </a:r>
-            <a:endParaRPr b="0" lang="en-US" sz="2400" spc="-1" strike="noStrike">
-              <a:solidFill>
-                <a:srgbClr val="000000"/>
-              </a:solidFill>
-              <a:latin typeface="Arial"/>
-            </a:endParaRPr>
-          </a:p>
-          <a:p>
-            <a:pPr marL="432000" indent="0">
-              <a:lnSpc>
-                <a:spcPct val="90000"/>
-              </a:lnSpc>
-              <a:spcBef>
-                <a:spcPts val="1100"/>
-              </a:spcBef>
-              <a:buNone/>
-            </a:pPr>
-            <a:endParaRPr b="0" lang="en-US" sz="2400" spc="-1" strike="noStrike">
-              <a:solidFill>
-                <a:srgbClr val="000000"/>
-              </a:solidFill>
-              <a:latin typeface="Arial"/>
-            </a:endParaRPr>
-          </a:p>
-        </p:txBody>
-      </p:sp>
+      <p:pic>
+        <p:nvPicPr>
+          <p:cNvPr id="122" name="" descr=""/>
+          <p:cNvPicPr/>
+          <p:nvPr/>
+        </p:nvPicPr>
+        <p:blipFill>
+          <a:blip r:embed="rId1"/>
+          <a:stretch/>
+        </p:blipFill>
+        <p:spPr>
+          <a:xfrm>
+            <a:off x="1600200" y="914400"/>
+            <a:ext cx="8748720" cy="5832360"/>
+          </a:xfrm>
+          <a:prstGeom prst="rect">
+            <a:avLst/>
+          </a:prstGeom>
+          <a:ln w="0">
+            <a:noFill/>
+          </a:ln>
+        </p:spPr>
+      </p:pic>
     </p:spTree>
   </p:cSld>
   <mc:AlternateContent>
@@ -7182,7 +6986,7 @@
       </p:grpSpPr>
       <p:sp>
         <p:nvSpPr>
-          <p:cNvPr id="110" name="PlaceHolder 1"/>
+          <p:cNvPr id="123" name="PlaceHolder 1"/>
           <p:cNvSpPr>
             <a:spLocks noGrp="1"/>
           </p:cNvSpPr>
@@ -7192,8 +6996,8 @@
         </p:nvSpPr>
         <p:spPr>
           <a:xfrm>
-            <a:off x="1371600" y="0"/>
-            <a:ext cx="9600480" cy="825840"/>
+            <a:off x="457200" y="228600"/>
+            <a:ext cx="9142920" cy="705600"/>
           </a:xfrm>
           <a:prstGeom prst="rect">
             <a:avLst/>
@@ -7224,7 +7028,7 @@
                 </a:solidFill>
                 <a:latin typeface="Calibri"/>
               </a:rPr>
-              <a:t>Συμπεράσματα – Μεταβολικά Μονοπάτια</a:t>
+              <a:t>Reduction Rate Σακχάρων – Σύγκριση Θερμοκρασιών</a:t>
             </a:r>
             <a:endParaRPr b="0" lang="en-US" sz="2800" spc="-1" strike="noStrike">
               <a:solidFill>
@@ -7235,9 +7039,402 @@
           </a:p>
         </p:txBody>
       </p:sp>
-      <p:sp>
-        <p:nvSpPr>
-          <p:cNvPr id="111" name="PlaceHolder 2"/>
+      <p:pic>
+        <p:nvPicPr>
+          <p:cNvPr id="124" name="" descr=""/>
+          <p:cNvPicPr/>
+          <p:nvPr/>
+        </p:nvPicPr>
+        <p:blipFill>
+          <a:blip r:embed="rId1"/>
+          <a:stretch/>
+        </p:blipFill>
+        <p:spPr>
+          <a:xfrm>
+            <a:off x="2293920" y="934560"/>
+            <a:ext cx="8120520" cy="5413320"/>
+          </a:xfrm>
+          <a:prstGeom prst="rect">
+            <a:avLst/>
+          </a:prstGeom>
+          <a:ln w="0">
+            <a:noFill/>
+          </a:ln>
+        </p:spPr>
+      </p:pic>
+    </p:spTree>
+  </p:cSld>
+  <mc:AlternateContent>
+    <mc:Choice Requires="p14">
+      <p:transition spd="slow" p14:dur="2000"/>
+    </mc:Choice>
+    <mc:Fallback>
+      <p:transition spd="slow"/>
+    </mc:Fallback>
+  </mc:AlternateContent>
+</p:sld>
+</file>
+
+<file path=ppt/slides/slide16.xml><?xml version="1.0" encoding="utf-8"?>
+<p:sld xmlns:a="http://schemas.openxmlformats.org/drawingml/2006/main" xmlns:p="http://schemas.openxmlformats.org/presentationml/2006/main" xmlns:r="http://schemas.openxmlformats.org/officeDocument/2006/relationships" xmlns:p14="http://schemas.microsoft.com/office/powerpoint/2010/main" xmlns:p15="http://schemas.microsoft.com/office/powerpoint/2012/main" xmlns:mc="http://schemas.openxmlformats.org/markup-compatibility/2006">
+  <p:cSld>
+    <p:spTree>
+      <p:nvGrpSpPr>
+        <p:cNvPr id="1" name=""/>
+        <p:cNvGrpSpPr/>
+        <p:nvPr/>
+      </p:nvGrpSpPr>
+      <p:grpSpPr>
+        <a:xfrm>
+          <a:off x="0" y="0"/>
+          <a:ext cx="0" cy="0"/>
+          <a:chOff x="0" y="0"/>
+          <a:chExt cx="0" cy="0"/>
+        </a:xfrm>
+      </p:grpSpPr>
+      <p:sp>
+        <p:nvSpPr>
+          <p:cNvPr id="125" name="PlaceHolder 1"/>
+          <p:cNvSpPr>
+            <a:spLocks noGrp="1"/>
+          </p:cNvSpPr>
+          <p:nvPr>
+            <p:ph type="title"/>
+          </p:nvPr>
+        </p:nvSpPr>
+        <p:spPr>
+          <a:xfrm>
+            <a:off x="914760" y="168840"/>
+            <a:ext cx="9142920" cy="825480"/>
+          </a:xfrm>
+          <a:prstGeom prst="rect">
+            <a:avLst/>
+          </a:prstGeom>
+          <a:noFill/>
+          <a:ln w="0">
+            <a:noFill/>
+          </a:ln>
+        </p:spPr>
+        <p:txBody>
+          <a:bodyPr lIns="0" rIns="0" tIns="0" bIns="0" anchor="ctr">
+            <a:noAutofit/>
+          </a:bodyPr>
+          <a:p>
+            <a:pPr indent="0">
+              <a:lnSpc>
+                <a:spcPct val="100000"/>
+              </a:lnSpc>
+              <a:buNone/>
+              <a:tabLst>
+                <a:tab algn="l" pos="0"/>
+              </a:tabLst>
+            </a:pPr>
+            <a:r>
+              <a:rPr b="0" lang="el-GR" sz="2800" spc="-1" strike="noStrike">
+                <a:solidFill>
+                  <a:schemeClr val="dk1"/>
+                </a:solidFill>
+                <a:latin typeface="Calibri"/>
+              </a:rPr>
+              <a:t>Μεταβολικά Μονοπάτια @45 C</a:t>
+            </a:r>
+            <a:endParaRPr b="0" lang="en-US" sz="2800" spc="-1" strike="noStrike">
+              <a:solidFill>
+                <a:srgbClr val="000000"/>
+              </a:solidFill>
+              <a:latin typeface="Arial"/>
+            </a:endParaRPr>
+          </a:p>
+        </p:txBody>
+      </p:sp>
+      <p:sp>
+        <p:nvSpPr>
+          <p:cNvPr id="126" name=""/>
+          <p:cNvSpPr txBox="1"/>
+          <p:nvPr/>
+        </p:nvSpPr>
+        <p:spPr>
+          <a:xfrm>
+            <a:off x="538560" y="905760"/>
+            <a:ext cx="11437920" cy="5756760"/>
+          </a:xfrm>
+          <a:prstGeom prst="rect">
+            <a:avLst/>
+          </a:prstGeom>
+          <a:noFill/>
+          <a:ln w="0">
+            <a:noFill/>
+          </a:ln>
+        </p:spPr>
+        <p:txBody>
+          <a:bodyPr lIns="90000" rIns="90000" tIns="45000" bIns="45000" anchor="t">
+            <a:noAutofit/>
+          </a:bodyPr>
+          <a:p>
+            <a:r>
+              <a:rPr b="0" lang="en-US" sz="2000" spc="-1" strike="noStrike">
+                <a:solidFill>
+                  <a:srgbClr val="000000"/>
+                </a:solidFill>
+                <a:latin typeface="Arial"/>
+              </a:rPr>
+              <a:t>Όπως φαίνεται στα προηγούμενα διαγράμματα, τα τελικά προιόντα στις 2 θερμοκρασίες είναι αρκετά διαφορετικά. Παράγεται αρκετά λιγότερη αιθανόλη και αρκετά περισσότερο οξικό. Οπότε, μπορεί να θεωρηθεί ένα διαφορετικό μεταβολικό μονοπάτι. Σε αυτό συμπεριλαμβάνουμε την πιθανότητα της μετατροπής των σακχάρων μόνο σε οξικό οξύ και την πιθανότητα να μην πάει όλη η γλυκόζη σε heterolactate. Επίσης μπορούν να συμπεριληφθούν και οι αντιδράσεις κατανάλωσης αιθανόλης προς οξικό και γαλακτικού προς προπιονικό καθώς οι μειώσεις τους είναι σημαντικές.</a:t>
+            </a:r>
+            <a:endParaRPr b="0" lang="en-US" sz="2000" spc="-1" strike="noStrike">
+              <a:solidFill>
+                <a:srgbClr val="000000"/>
+              </a:solidFill>
+              <a:latin typeface="Arial"/>
+            </a:endParaRPr>
+          </a:p>
+          <a:p>
+            <a:endParaRPr b="0" lang="en-US" sz="2000" spc="-1" strike="noStrike">
+              <a:solidFill>
+                <a:srgbClr val="000000"/>
+              </a:solidFill>
+              <a:latin typeface="Arial"/>
+            </a:endParaRPr>
+          </a:p>
+          <a:p>
+            <a:r>
+              <a:rPr b="0" lang="en-US" sz="2000" spc="-1" strike="noStrike">
+                <a:solidFill>
+                  <a:srgbClr val="000000"/>
+                </a:solidFill>
+                <a:latin typeface="Arial"/>
+              </a:rPr>
+              <a:t>Για τις συγκεντρώσεις του πρώτου δοχείου, μπορούν να εξηγηθούν εύκολα αν το 90% της γλυκόζης πάει σε heterolactate και τα υπόλοιπα σάκχαρα πάνε κατά 30% σε παραγωγή οξικού και προπιονικού και το 70% μόνο σε οξικό. Έτσι, βλέπουμε το peak αιθανόλης και γαλακτικού, με overestimation των οξέων την ίδια ώρα, αλλά σε εύλογο βαθμό καθώς τα βλέπουμε σε πολύ μεγάλες τιμές την τελική στιγμή του πειράματος (171 h). Μαζί με τις αντιδράσεις κατανάλωσης τους, το προπιονικό και το οξικό γίνονται αρκετά overestimated, αλλά είχαν αρκετή τάση αύξησης, οπότε αν το πείραμα αφηνόταν περισσότερες μέρες ίσως βλέπαμε αυτές τις τιμές.</a:t>
+            </a:r>
+            <a:endParaRPr b="0" lang="en-US" sz="2000" spc="-1" strike="noStrike">
+              <a:solidFill>
+                <a:srgbClr val="000000"/>
+              </a:solidFill>
+              <a:latin typeface="Arial"/>
+            </a:endParaRPr>
+          </a:p>
+          <a:p>
+            <a:endParaRPr b="0" lang="en-US" sz="2000" spc="-1" strike="noStrike">
+              <a:solidFill>
+                <a:srgbClr val="000000"/>
+              </a:solidFill>
+              <a:latin typeface="Arial"/>
+            </a:endParaRPr>
+          </a:p>
+          <a:p>
+            <a:r>
+              <a:rPr b="0" lang="en-US" sz="2000" spc="-1" strike="noStrike">
+                <a:solidFill>
+                  <a:srgbClr val="000000"/>
+                </a:solidFill>
+                <a:latin typeface="Arial"/>
+              </a:rPr>
+              <a:t>Για το 2ο δοχείο, παράχθηκε περισσότερη αιθανόλη, οπότε θεωρήθηκε όλη η γλυκόζη και το 18% της φρουκτόζης δώσαν ένα mol αιθανόλης κατά τον μεταβολισμό τους. Απτην υπόλοιπη φρουκτόζη, το 38% πήγε μόνο σε οξικό και το 44% σε μίγμα οξέων. Με αυτά, έχουμε παρόμοιο αποτέλεσμα του σωστού prediction αιθανόλης και γαλακτικού αλλά μικρή υπερεκτίμηση των οξέων που αναμένεται να αυξηθούν περαιτέρω μέχρι την μόνιμη κατάσταση.</a:t>
+            </a:r>
+            <a:endParaRPr b="0" lang="en-US" sz="2000" spc="-1" strike="noStrike">
+              <a:solidFill>
+                <a:srgbClr val="000000"/>
+              </a:solidFill>
+              <a:latin typeface="Arial"/>
+            </a:endParaRPr>
+          </a:p>
+        </p:txBody>
+      </p:sp>
+    </p:spTree>
+  </p:cSld>
+  <mc:AlternateContent>
+    <mc:Choice Requires="p14">
+      <p:transition spd="slow" p14:dur="2000"/>
+    </mc:Choice>
+    <mc:Fallback>
+      <p:transition spd="slow"/>
+    </mc:Fallback>
+  </mc:AlternateContent>
+</p:sld>
+</file>
+
+<file path=ppt/slides/slide17.xml><?xml version="1.0" encoding="utf-8"?>
+<p:sld xmlns:a="http://schemas.openxmlformats.org/drawingml/2006/main" xmlns:p="http://schemas.openxmlformats.org/presentationml/2006/main" xmlns:r="http://schemas.openxmlformats.org/officeDocument/2006/relationships" xmlns:p14="http://schemas.microsoft.com/office/powerpoint/2010/main" xmlns:p15="http://schemas.microsoft.com/office/powerpoint/2012/main" xmlns:mc="http://schemas.openxmlformats.org/markup-compatibility/2006">
+  <p:cSld>
+    <p:spTree>
+      <p:nvGrpSpPr>
+        <p:cNvPr id="1" name=""/>
+        <p:cNvGrpSpPr/>
+        <p:nvPr/>
+      </p:nvGrpSpPr>
+      <p:grpSpPr>
+        <a:xfrm>
+          <a:off x="0" y="0"/>
+          <a:ext cx="0" cy="0"/>
+          <a:chOff x="0" y="0"/>
+          <a:chExt cx="0" cy="0"/>
+        </a:xfrm>
+      </p:grpSpPr>
+      <p:sp>
+        <p:nvSpPr>
+          <p:cNvPr id="127" name="PlaceHolder 1"/>
+          <p:cNvSpPr>
+            <a:spLocks noGrp="1"/>
+          </p:cNvSpPr>
+          <p:nvPr>
+            <p:ph type="title"/>
+          </p:nvPr>
+        </p:nvSpPr>
+        <p:spPr>
+          <a:xfrm>
+            <a:off x="914760" y="168840"/>
+            <a:ext cx="9142920" cy="825480"/>
+          </a:xfrm>
+          <a:prstGeom prst="rect">
+            <a:avLst/>
+          </a:prstGeom>
+          <a:noFill/>
+          <a:ln w="0">
+            <a:noFill/>
+          </a:ln>
+        </p:spPr>
+        <p:txBody>
+          <a:bodyPr lIns="0" rIns="0" tIns="0" bIns="0" anchor="ctr">
+            <a:noAutofit/>
+          </a:bodyPr>
+          <a:p>
+            <a:pPr indent="0">
+              <a:lnSpc>
+                <a:spcPct val="100000"/>
+              </a:lnSpc>
+              <a:buNone/>
+              <a:tabLst>
+                <a:tab algn="l" pos="0"/>
+              </a:tabLst>
+            </a:pPr>
+            <a:r>
+              <a:rPr b="0" lang="el-GR" sz="2800" spc="-1" strike="noStrike">
+                <a:solidFill>
+                  <a:schemeClr val="dk1"/>
+                </a:solidFill>
+                <a:latin typeface="Calibri"/>
+              </a:rPr>
+              <a:t>Μεταβολικά Μονοπάτια @45 C</a:t>
+            </a:r>
+            <a:endParaRPr b="0" lang="en-US" sz="2800" spc="-1" strike="noStrike">
+              <a:solidFill>
+                <a:srgbClr val="000000"/>
+              </a:solidFill>
+              <a:latin typeface="Arial"/>
+            </a:endParaRPr>
+          </a:p>
+        </p:txBody>
+      </p:sp>
+      <p:pic>
+        <p:nvPicPr>
+          <p:cNvPr id="128" name="" descr=""/>
+          <p:cNvPicPr/>
+          <p:nvPr/>
+        </p:nvPicPr>
+        <p:blipFill>
+          <a:blip r:embed="rId1"/>
+          <a:stretch/>
+        </p:blipFill>
+        <p:spPr>
+          <a:xfrm>
+            <a:off x="561960" y="1192320"/>
+            <a:ext cx="11117160" cy="4631760"/>
+          </a:xfrm>
+          <a:prstGeom prst="rect">
+            <a:avLst/>
+          </a:prstGeom>
+          <a:ln w="0">
+            <a:noFill/>
+          </a:ln>
+        </p:spPr>
+      </p:pic>
+    </p:spTree>
+  </p:cSld>
+  <mc:AlternateContent>
+    <mc:Choice Requires="p14">
+      <p:transition spd="slow" p14:dur="2000"/>
+    </mc:Choice>
+    <mc:Fallback>
+      <p:transition spd="slow"/>
+    </mc:Fallback>
+  </mc:AlternateContent>
+</p:sld>
+</file>
+
+<file path=ppt/slides/slide18.xml><?xml version="1.0" encoding="utf-8"?>
+<p:sld xmlns:a="http://schemas.openxmlformats.org/drawingml/2006/main" xmlns:p="http://schemas.openxmlformats.org/presentationml/2006/main" xmlns:r="http://schemas.openxmlformats.org/officeDocument/2006/relationships" xmlns:p14="http://schemas.microsoft.com/office/powerpoint/2010/main" xmlns:p15="http://schemas.microsoft.com/office/powerpoint/2012/main" xmlns:mc="http://schemas.openxmlformats.org/markup-compatibility/2006">
+  <p:cSld>
+    <p:spTree>
+      <p:nvGrpSpPr>
+        <p:cNvPr id="1" name=""/>
+        <p:cNvGrpSpPr/>
+        <p:nvPr/>
+      </p:nvGrpSpPr>
+      <p:grpSpPr>
+        <a:xfrm>
+          <a:off x="0" y="0"/>
+          <a:ext cx="0" cy="0"/>
+          <a:chOff x="0" y="0"/>
+          <a:chExt cx="0" cy="0"/>
+        </a:xfrm>
+      </p:grpSpPr>
+      <p:sp>
+        <p:nvSpPr>
+          <p:cNvPr id="129" name="PlaceHolder 1"/>
+          <p:cNvSpPr>
+            <a:spLocks noGrp="1"/>
+          </p:cNvSpPr>
+          <p:nvPr>
+            <p:ph type="title"/>
+          </p:nvPr>
+        </p:nvSpPr>
+        <p:spPr>
+          <a:xfrm>
+            <a:off x="1371960" y="108000"/>
+            <a:ext cx="9600120" cy="825480"/>
+          </a:xfrm>
+          <a:prstGeom prst="rect">
+            <a:avLst/>
+          </a:prstGeom>
+          <a:noFill/>
+          <a:ln w="0">
+            <a:noFill/>
+          </a:ln>
+        </p:spPr>
+        <p:txBody>
+          <a:bodyPr lIns="0" rIns="0" tIns="0" bIns="0" anchor="ctr">
+            <a:noAutofit/>
+          </a:bodyPr>
+          <a:p>
+            <a:pPr indent="0">
+              <a:lnSpc>
+                <a:spcPct val="100000"/>
+              </a:lnSpc>
+              <a:buNone/>
+              <a:tabLst>
+                <a:tab algn="l" pos="0"/>
+              </a:tabLst>
+            </a:pPr>
+            <a:r>
+              <a:rPr b="0" lang="el-GR" sz="2800" spc="-1" strike="noStrike">
+                <a:solidFill>
+                  <a:schemeClr val="dk1"/>
+                </a:solidFill>
+                <a:latin typeface="Calibri"/>
+              </a:rPr>
+              <a:t>Συμπεράσματα – Κατανάλωση σακχάρων, pH, Αγωγιμότητα</a:t>
+            </a:r>
+            <a:endParaRPr b="0" lang="en-US" sz="2800" spc="-1" strike="noStrike">
+              <a:solidFill>
+                <a:srgbClr val="000000"/>
+              </a:solidFill>
+              <a:latin typeface="Arial"/>
+            </a:endParaRPr>
+          </a:p>
+        </p:txBody>
+      </p:sp>
+      <p:sp>
+        <p:nvSpPr>
+          <p:cNvPr id="130" name="PlaceHolder 2"/>
           <p:cNvSpPr>
             <a:spLocks noGrp="1"/>
           </p:cNvSpPr>
@@ -7247,8 +7444,277 @@
         </p:nvSpPr>
         <p:spPr>
           <a:xfrm>
-            <a:off x="457920" y="826200"/>
-            <a:ext cx="10972080" cy="5803200"/>
+            <a:off x="457560" y="1051920"/>
+            <a:ext cx="10971720" cy="5119560"/>
+          </a:xfrm>
+          <a:prstGeom prst="rect">
+            <a:avLst/>
+          </a:prstGeom>
+          <a:noFill/>
+          <a:ln w="0">
+            <a:noFill/>
+          </a:ln>
+        </p:spPr>
+        <p:txBody>
+          <a:bodyPr lIns="0" rIns="0" tIns="0" bIns="0" anchor="t">
+            <a:normAutofit fontScale="83888"/>
+          </a:bodyPr>
+          <a:p>
+            <a:pPr marL="432000" indent="-324000">
+              <a:lnSpc>
+                <a:spcPct val="90000"/>
+              </a:lnSpc>
+              <a:spcBef>
+                <a:spcPts val="1100"/>
+              </a:spcBef>
+              <a:buClr>
+                <a:srgbClr val="000000"/>
+              </a:buClr>
+              <a:buSzPct val="45000"/>
+              <a:buFont typeface="Wingdings" charset="2"/>
+              <a:buChar char=""/>
+            </a:pPr>
+            <a:r>
+              <a:rPr b="0" lang="el-GR" sz="2400" spc="-1" strike="noStrike">
+                <a:solidFill>
+                  <a:schemeClr val="dk1"/>
+                </a:solidFill>
+                <a:latin typeface="Calibri"/>
+              </a:rPr>
+              <a:t>Η γλυκόζη τελειώνει πολύ κοντά στις 24 ώρες πειράματος και στις δύο θερμοκρασίες. Για θερμοκρασία 35 C το όργανο μετράει γλυκόζη σε όλα τα πειράματα στις 24 ώρες, αλλά η καμπύλη μας βγάζει ότι αυτή η συγκέντρωση είναι αρνητική (άρα είναι πολύ κοντά στο 0). Μόνη εξαίρεση αποτελεί το πείραμα με 8 mL, όπου το οργάνο δεν μπορεί καν να ανιχνεύσει γλυκόζη στις 24 ώρες άρα τελείωσε νωρίτερα. Στους 45 C, στη μία επανάληψη η γλυκόζη έχει τελειώσει στις 24 ώρες και στην άλλη στις 26 ώρες περίπου.</a:t>
+            </a:r>
+            <a:endParaRPr b="0" lang="en-US" sz="2400" spc="-1" strike="noStrike">
+              <a:solidFill>
+                <a:srgbClr val="000000"/>
+              </a:solidFill>
+              <a:latin typeface="Arial"/>
+            </a:endParaRPr>
+          </a:p>
+          <a:p>
+            <a:pPr marL="432000" indent="-324000">
+              <a:lnSpc>
+                <a:spcPct val="90000"/>
+              </a:lnSpc>
+              <a:spcBef>
+                <a:spcPts val="1100"/>
+              </a:spcBef>
+              <a:buClr>
+                <a:srgbClr val="000000"/>
+              </a:buClr>
+              <a:buSzPct val="45000"/>
+              <a:buFont typeface="Wingdings" charset="2"/>
+              <a:buChar char=""/>
+            </a:pPr>
+            <a:r>
+              <a:rPr b="0" lang="el-GR" sz="2400" spc="-1" strike="noStrike">
+                <a:solidFill>
+                  <a:schemeClr val="dk1"/>
+                </a:solidFill>
+                <a:latin typeface="Calibri"/>
+              </a:rPr>
+              <a:t>Η σακχαρόζη τελειώνει μετά τις 24 ώρες, αλλά μέχρι τότε έχει καταναλωθεί ένα σημαντικό ποσόστο.</a:t>
+            </a:r>
+            <a:endParaRPr b="0" lang="en-US" sz="2400" spc="-1" strike="noStrike">
+              <a:solidFill>
+                <a:srgbClr val="000000"/>
+              </a:solidFill>
+              <a:latin typeface="Arial"/>
+            </a:endParaRPr>
+          </a:p>
+          <a:p>
+            <a:pPr marL="432000" indent="-324000">
+              <a:lnSpc>
+                <a:spcPct val="90000"/>
+              </a:lnSpc>
+              <a:spcBef>
+                <a:spcPts val="1100"/>
+              </a:spcBef>
+              <a:buClr>
+                <a:srgbClr val="000000"/>
+              </a:buClr>
+              <a:buSzPct val="45000"/>
+              <a:buFont typeface="Wingdings" charset="2"/>
+              <a:buChar char=""/>
+            </a:pPr>
+            <a:r>
+              <a:rPr b="0" lang="el-GR" sz="2400" spc="-1" strike="noStrike">
+                <a:solidFill>
+                  <a:schemeClr val="dk1"/>
+                </a:solidFill>
+                <a:latin typeface="Calibri"/>
+              </a:rPr>
+              <a:t>Η φρουκτόζη μπορεί να καταναλωθεί πλήρως στους 35 C αλλά πιο αργά από τα άλλα σάκχαρα (στις 72 h η συγκέντρωση ήταν κοντά στο 0). Στους 45 C, καταναλώνεται και πάλι με αργό ρυθμό, αλλά ακόμη και σε 171 h δεν καταναλώθηκε πλήρως αλλά μόνο περίπου κατά τα 2/3. Αυτό ίσως σημαίνει ότι οι μικροοργανισμοί που μπορούν να την μεταβολίσουν είναι μεσόφιλοι. </a:t>
+            </a:r>
+            <a:endParaRPr b="0" lang="en-US" sz="2400" spc="-1" strike="noStrike">
+              <a:solidFill>
+                <a:srgbClr val="000000"/>
+              </a:solidFill>
+              <a:latin typeface="Arial"/>
+            </a:endParaRPr>
+          </a:p>
+          <a:p>
+            <a:pPr marL="432000" indent="-324000">
+              <a:lnSpc>
+                <a:spcPct val="90000"/>
+              </a:lnSpc>
+              <a:spcBef>
+                <a:spcPts val="1100"/>
+              </a:spcBef>
+              <a:buClr>
+                <a:srgbClr val="000000"/>
+              </a:buClr>
+              <a:buSzPct val="45000"/>
+              <a:buFont typeface="Wingdings" charset="2"/>
+              <a:buChar char=""/>
+            </a:pPr>
+            <a:r>
+              <a:rPr b="0" lang="el-GR" sz="2400" spc="-1" strike="noStrike">
+                <a:solidFill>
+                  <a:schemeClr val="dk1"/>
+                </a:solidFill>
+                <a:latin typeface="Calibri"/>
+              </a:rPr>
+              <a:t>Το pH έχει μία μικρή μείωση κατά τις πρώτες 48 ώρες, αλλά μετά αρχίζουν να παράγονται περισσότερα οξέα και μειώνεται σημαντικά.</a:t>
+            </a:r>
+            <a:endParaRPr b="0" lang="en-US" sz="2400" spc="-1" strike="noStrike">
+              <a:solidFill>
+                <a:srgbClr val="000000"/>
+              </a:solidFill>
+              <a:latin typeface="Arial"/>
+            </a:endParaRPr>
+          </a:p>
+          <a:p>
+            <a:pPr marL="432000" indent="-324000">
+              <a:lnSpc>
+                <a:spcPct val="90000"/>
+              </a:lnSpc>
+              <a:spcBef>
+                <a:spcPts val="1100"/>
+              </a:spcBef>
+              <a:buClr>
+                <a:srgbClr val="000000"/>
+              </a:buClr>
+              <a:buSzPct val="45000"/>
+              <a:buFont typeface="Wingdings" charset="2"/>
+              <a:buChar char=""/>
+            </a:pPr>
+            <a:r>
+              <a:rPr b="0" lang="el-GR" sz="2400" spc="-1" strike="noStrike">
+                <a:solidFill>
+                  <a:schemeClr val="dk1"/>
+                </a:solidFill>
+                <a:latin typeface="Calibri"/>
+              </a:rPr>
+              <a:t>Η ηλεκτρική αγωγιμότητα έχει μία μικρή αύξηση κατά την διάρκεια του πειράματος</a:t>
+            </a:r>
+            <a:endParaRPr b="0" lang="en-US" sz="2400" spc="-1" strike="noStrike">
+              <a:solidFill>
+                <a:srgbClr val="000000"/>
+              </a:solidFill>
+              <a:latin typeface="Arial"/>
+            </a:endParaRPr>
+          </a:p>
+        </p:txBody>
+      </p:sp>
+    </p:spTree>
+  </p:cSld>
+  <mc:AlternateContent>
+    <mc:Choice Requires="p14">
+      <p:transition spd="slow" p14:dur="2000"/>
+    </mc:Choice>
+    <mc:Fallback>
+      <p:transition spd="slow"/>
+    </mc:Fallback>
+  </mc:AlternateContent>
+</p:sld>
+</file>
+
+<file path=ppt/slides/slide19.xml><?xml version="1.0" encoding="utf-8"?>
+<p:sld xmlns:a="http://schemas.openxmlformats.org/drawingml/2006/main" xmlns:p="http://schemas.openxmlformats.org/presentationml/2006/main" xmlns:r="http://schemas.openxmlformats.org/officeDocument/2006/relationships" xmlns:p14="http://schemas.microsoft.com/office/powerpoint/2010/main" xmlns:p15="http://schemas.microsoft.com/office/powerpoint/2012/main" xmlns:mc="http://schemas.openxmlformats.org/markup-compatibility/2006">
+  <p:cSld>
+    <p:spTree>
+      <p:nvGrpSpPr>
+        <p:cNvPr id="1" name=""/>
+        <p:cNvGrpSpPr/>
+        <p:nvPr/>
+      </p:nvGrpSpPr>
+      <p:grpSpPr>
+        <a:xfrm>
+          <a:off x="0" y="0"/>
+          <a:ext cx="0" cy="0"/>
+          <a:chOff x="0" y="0"/>
+          <a:chExt cx="0" cy="0"/>
+        </a:xfrm>
+      </p:grpSpPr>
+      <p:sp>
+        <p:nvSpPr>
+          <p:cNvPr id="131" name="PlaceHolder 1"/>
+          <p:cNvSpPr>
+            <a:spLocks noGrp="1"/>
+          </p:cNvSpPr>
+          <p:nvPr>
+            <p:ph type="title"/>
+          </p:nvPr>
+        </p:nvSpPr>
+        <p:spPr>
+          <a:xfrm>
+            <a:off x="1372320" y="-140040"/>
+            <a:ext cx="9600120" cy="825480"/>
+          </a:xfrm>
+          <a:prstGeom prst="rect">
+            <a:avLst/>
+          </a:prstGeom>
+          <a:noFill/>
+          <a:ln w="0">
+            <a:noFill/>
+          </a:ln>
+        </p:spPr>
+        <p:txBody>
+          <a:bodyPr lIns="0" rIns="0" tIns="0" bIns="0" anchor="ctr">
+            <a:noAutofit/>
+          </a:bodyPr>
+          <a:p>
+            <a:pPr indent="0">
+              <a:lnSpc>
+                <a:spcPct val="100000"/>
+              </a:lnSpc>
+              <a:buNone/>
+              <a:tabLst>
+                <a:tab algn="l" pos="0"/>
+              </a:tabLst>
+            </a:pPr>
+            <a:r>
+              <a:rPr b="0" lang="el-GR" sz="2800" spc="-1" strike="noStrike">
+                <a:solidFill>
+                  <a:schemeClr val="dk1"/>
+                </a:solidFill>
+                <a:latin typeface="Calibri"/>
+              </a:rPr>
+              <a:t>Συμπεράσματα – Προιόντα</a:t>
+            </a:r>
+            <a:endParaRPr b="0" lang="en-US" sz="2800" spc="-1" strike="noStrike">
+              <a:solidFill>
+                <a:srgbClr val="000000"/>
+              </a:solidFill>
+              <a:latin typeface="Arial"/>
+            </a:endParaRPr>
+          </a:p>
+        </p:txBody>
+      </p:sp>
+      <p:sp>
+        <p:nvSpPr>
+          <p:cNvPr id="132" name="PlaceHolder 2"/>
+          <p:cNvSpPr>
+            <a:spLocks noGrp="1"/>
+          </p:cNvSpPr>
+          <p:nvPr>
+            <p:ph/>
+          </p:nvPr>
+        </p:nvSpPr>
+        <p:spPr>
+          <a:xfrm>
+            <a:off x="457920" y="334440"/>
+            <a:ext cx="10971720" cy="5943240"/>
           </a:xfrm>
           <a:prstGeom prst="rect">
             <a:avLst/>
@@ -7272,6 +7738,28 @@
               </a:spcBef>
               <a:buNone/>
             </a:pPr>
+            <a:endParaRPr b="0" lang="en-US" sz="2400" spc="-1" strike="noStrike">
+              <a:solidFill>
+                <a:srgbClr val="000000"/>
+              </a:solidFill>
+              <a:latin typeface="Arial"/>
+            </a:endParaRPr>
+          </a:p>
+          <a:p>
+            <a:pPr marL="432000" indent="-324000">
+              <a:lnSpc>
+                <a:spcPct val="90000"/>
+              </a:lnSpc>
+              <a:spcBef>
+                <a:spcPts val="1100"/>
+              </a:spcBef>
+              <a:buClr>
+                <a:srgbClr val="000000"/>
+              </a:buClr>
+              <a:buSzPct val="45000"/>
+              <a:buFont typeface="Wingdings" charset="2"/>
+              <a:buChar char=""/>
+            </a:pPr>
             <a:r>
               <a:rPr b="0" lang="el-GR" sz="2400" spc="-1" strike="noStrike">
                 <a:solidFill>
@@ -7279,8 +7767,59 @@
                 </a:solidFill>
                 <a:latin typeface="Calibri"/>
               </a:rPr>
-              <a:t>Όπως αναφέρθηκε, το μονοπάτι που ακολουθείται φαίνεται να έχει μεγάλη παραγωγή αιθανόλης, η οποία φαίνεται στις 24 ώρες αλλά δείχνει να συνοδεύεται από την παραγωγή κάποιου οξέος. Τα δύο βασικά μονοπάτια στα οποία συμβαίνει αυτό είναι το heterolactic fermentation και το acetate-ethanol type fermentation. Βιβλιογραφικά ξέρουμε πως και τα δύο λειτουργούν σε αρκετά όξινα pH αλλά το heterolactic fermentation έχει μεγαλύτερη ανοχή σε όξινο pH (όριο περίπου το 3.2 σε αντίθεση με 4 από το άλλο). Με βάση το πείραμα υπάρχουν και τα δύο σε διαφορετικές αναλογίες. Σε μικρή ποσότητα μιξ, στους 35 C, το οξικό οξύ φαίνεται να είναι το κύριο συμπροιόν. Αν η ποσότητα όμως αυξηθεί, το γαλακτικό οξύ αρχίζει να υπερισχύει ως βασικό μεταβολικό προιόν. Στους 45 C, το οξικό υπερισχύει ακόμη και σε μεγάλη ποσότητα μιξ. Συμπέρασμα είναι πως οι οξικογόνοι είναι θερμόφιλοι ενώ οι μικροοργανισμοί που παράγουν γαλακτικό είναι μεσόφιλοι. Επίσης οι 2 ομάδες αυτές δρουν ανταγωνιστικά, καθώς οι οξικογόνοι μπορούν να χρησιμοποιήσουν το γαλακτικό οξύ ως υπόστρωμα αλλά αν ο ρυθμός τους είναι αργός, μπορεί να συσσωρευτεί πολύ γαλακτικό οξύ και να υπερισχύσει αυτό ως προιόν.</a:t>
-            </a:r>
+              <a:t>Βασικότερο προιόν της γλυκόζης αποτελεί η αιθανόλη καθώς παρατηρείται μία μεγάλη αύξηση της στο 24ωρο. Οι μικροοργανισμοί που κάνουν την μετατροπή αυτή είναι μεσόφιλοι καθώς στους 35 C γίνεται καλύτερα. Βέβαια, στις 48 ώρες παρατηρείται αύξηση και των οξέων χωρίς να μειωθεί σημαντικά κάποια ένωση, οπότε το μονοπάτι που ακολουθείται παράγει αιθανόλη με ένα συμπροιόν (είτε γαλακτικό ή οξικό οξύ</a:t>
+            </a:r>
+            <a:endParaRPr b="0" lang="en-US" sz="2400" spc="-1" strike="noStrike">
+              <a:solidFill>
+                <a:srgbClr val="000000"/>
+              </a:solidFill>
+              <a:latin typeface="Arial"/>
+            </a:endParaRPr>
+          </a:p>
+          <a:p>
+            <a:pPr marL="432000" indent="-324000">
+              <a:lnSpc>
+                <a:spcPct val="90000"/>
+              </a:lnSpc>
+              <a:spcBef>
+                <a:spcPts val="1100"/>
+              </a:spcBef>
+              <a:buClr>
+                <a:srgbClr val="000000"/>
+              </a:buClr>
+              <a:buSzPct val="45000"/>
+              <a:buFont typeface="Wingdings" charset="2"/>
+              <a:buChar char=""/>
+            </a:pPr>
+            <a:r>
+              <a:rPr b="0" lang="el-GR" sz="2400" spc="-1" strike="noStrike">
+                <a:solidFill>
+                  <a:schemeClr val="dk1"/>
+                </a:solidFill>
+                <a:latin typeface="Calibri"/>
+              </a:rPr>
+              <a:t>Σε μικρή ποσότητα μιξ, στους 35 C, το οξικό οξύ φαίνεται να είναι το κύριο συμπροιόν της αιθανόλης. Αν η ποσότητα όμως αυξηθεί, το γαλακτικό οξύ αρχίζει να υπερισχύει ως βασικό μεταβολικό προιόν. Στους 45 C, το οξικό υπερισχύει ακόμη και σε μεγάλη ποσότητα μιξ. Συμπέρασμα είναι πως τα food waste δεν έχουν τόσους μικροοργανισμούς που παράγουν γαλακτικό οξύ και ότι οι οξικογόνοι είναι θερμόφιλοι ενώ οι μικροοργανισμοί που παράγουν γαλακτικό είναι μεσόφιλοι. Επίσης οι 2 ομάδες αυτές δρουν ανταγωνιστικά, καθώς οι οξικογόνοι μπορούν να χρησιμοποιήσουν το γαλακτικό οξύ ως υπόστρωμα αλλά αν ο ρυθμός τους είναι αργός, μπορεί να συσσωρευτεί πολύ γαλακτικό οξύ και να υπερισχύσει αυτό ως προιόν.</a:t>
+            </a:r>
+            <a:endParaRPr b="0" lang="en-US" sz="2400" spc="-1" strike="noStrike">
+              <a:solidFill>
+                <a:srgbClr val="000000"/>
+              </a:solidFill>
+              <a:latin typeface="Arial"/>
+            </a:endParaRPr>
+          </a:p>
+          <a:p>
+            <a:pPr marL="432000" indent="0">
+              <a:lnSpc>
+                <a:spcPct val="90000"/>
+              </a:lnSpc>
+              <a:spcBef>
+                <a:spcPts val="1100"/>
+              </a:spcBef>
+              <a:buNone/>
+              <a:tabLst>
+                <a:tab algn="l" pos="0"/>
+              </a:tabLst>
+            </a:pPr>
             <a:endParaRPr b="0" lang="en-US" sz="2400" spc="-1" strike="noStrike">
               <a:solidFill>
                 <a:srgbClr val="000000"/>
@@ -7333,7 +7872,7 @@
         <p:spPr>
           <a:xfrm>
             <a:off x="1523880" y="228600"/>
-            <a:ext cx="9143280" cy="914040"/>
+            <a:ext cx="9142920" cy="913680"/>
           </a:xfrm>
           <a:prstGeom prst="rect">
             <a:avLst/>
@@ -7388,7 +7927,7 @@
         <p:spPr>
           <a:xfrm>
             <a:off x="609480" y="1600200"/>
-            <a:ext cx="10972080" cy="3976920"/>
+            <a:ext cx="10971720" cy="3976560"/>
           </a:xfrm>
           <a:prstGeom prst="rect">
             <a:avLst/>
@@ -7587,6 +8126,262 @@
                 <a:latin typeface="Calibri"/>
               </a:rPr>
               <a:t>Σύγκριση των ποσοτήτων μεταξύ τους και σύγκριση των 2 mL με το πείραμα στους 45 C</a:t>
+            </a:r>
+            <a:endParaRPr b="0" lang="en-US" sz="2400" spc="-1" strike="noStrike">
+              <a:solidFill>
+                <a:srgbClr val="000000"/>
+              </a:solidFill>
+              <a:latin typeface="Arial"/>
+            </a:endParaRPr>
+          </a:p>
+        </p:txBody>
+      </p:sp>
+    </p:spTree>
+  </p:cSld>
+  <mc:AlternateContent>
+    <mc:Choice Requires="p14">
+      <p:transition spd="slow" p14:dur="2000"/>
+    </mc:Choice>
+    <mc:Fallback>
+      <p:transition spd="slow"/>
+    </mc:Fallback>
+  </mc:AlternateContent>
+</p:sld>
+</file>
+
+<file path=ppt/slides/slide20.xml><?xml version="1.0" encoding="utf-8"?>
+<p:sld xmlns:a="http://schemas.openxmlformats.org/drawingml/2006/main" xmlns:p="http://schemas.openxmlformats.org/presentationml/2006/main" xmlns:r="http://schemas.openxmlformats.org/officeDocument/2006/relationships" xmlns:p14="http://schemas.microsoft.com/office/powerpoint/2010/main" xmlns:p15="http://schemas.microsoft.com/office/powerpoint/2012/main" xmlns:mc="http://schemas.openxmlformats.org/markup-compatibility/2006">
+  <p:cSld>
+    <p:spTree>
+      <p:nvGrpSpPr>
+        <p:cNvPr id="1" name=""/>
+        <p:cNvGrpSpPr/>
+        <p:nvPr/>
+      </p:nvGrpSpPr>
+      <p:grpSpPr>
+        <a:xfrm>
+          <a:off x="0" y="0"/>
+          <a:ext cx="0" cy="0"/>
+          <a:chOff x="0" y="0"/>
+          <a:chExt cx="0" cy="0"/>
+        </a:xfrm>
+      </p:grpSpPr>
+      <p:sp>
+        <p:nvSpPr>
+          <p:cNvPr id="133" name="PlaceHolder 1"/>
+          <p:cNvSpPr>
+            <a:spLocks noGrp="1"/>
+          </p:cNvSpPr>
+          <p:nvPr>
+            <p:ph type="title"/>
+          </p:nvPr>
+        </p:nvSpPr>
+        <p:spPr>
+          <a:xfrm>
+            <a:off x="1371600" y="0"/>
+            <a:ext cx="9600120" cy="825480"/>
+          </a:xfrm>
+          <a:prstGeom prst="rect">
+            <a:avLst/>
+          </a:prstGeom>
+          <a:noFill/>
+          <a:ln w="0">
+            <a:noFill/>
+          </a:ln>
+        </p:spPr>
+        <p:txBody>
+          <a:bodyPr lIns="0" rIns="0" tIns="0" bIns="0" anchor="ctr">
+            <a:noAutofit/>
+          </a:bodyPr>
+          <a:p>
+            <a:pPr indent="0">
+              <a:lnSpc>
+                <a:spcPct val="100000"/>
+              </a:lnSpc>
+              <a:buNone/>
+              <a:tabLst>
+                <a:tab algn="l" pos="0"/>
+              </a:tabLst>
+            </a:pPr>
+            <a:r>
+              <a:rPr b="0" lang="el-GR" sz="2800" spc="-1" strike="noStrike">
+                <a:solidFill>
+                  <a:schemeClr val="dk1"/>
+                </a:solidFill>
+                <a:latin typeface="Calibri"/>
+              </a:rPr>
+              <a:t>Συμπεράσματα – Προιόντα ΙΙ</a:t>
+            </a:r>
+            <a:endParaRPr b="0" lang="en-US" sz="2800" spc="-1" strike="noStrike">
+              <a:solidFill>
+                <a:srgbClr val="000000"/>
+              </a:solidFill>
+              <a:latin typeface="Arial"/>
+            </a:endParaRPr>
+          </a:p>
+        </p:txBody>
+      </p:sp>
+      <p:sp>
+        <p:nvSpPr>
+          <p:cNvPr id="134" name="PlaceHolder 2"/>
+          <p:cNvSpPr>
+            <a:spLocks noGrp="1"/>
+          </p:cNvSpPr>
+          <p:nvPr>
+            <p:ph/>
+          </p:nvPr>
+        </p:nvSpPr>
+        <p:spPr>
+          <a:xfrm>
+            <a:off x="457920" y="779400"/>
+            <a:ext cx="10971720" cy="5802840"/>
+          </a:xfrm>
+          <a:prstGeom prst="rect">
+            <a:avLst/>
+          </a:prstGeom>
+          <a:noFill/>
+          <a:ln w="0">
+            <a:noFill/>
+          </a:ln>
+        </p:spPr>
+        <p:txBody>
+          <a:bodyPr lIns="0" rIns="0" tIns="0" bIns="0" anchor="t">
+            <a:normAutofit fontScale="85555"/>
+          </a:bodyPr>
+          <a:p>
+            <a:pPr marL="432000" indent="0">
+              <a:lnSpc>
+                <a:spcPct val="90000"/>
+              </a:lnSpc>
+              <a:spcBef>
+                <a:spcPts val="1100"/>
+              </a:spcBef>
+              <a:buNone/>
+              <a:tabLst>
+                <a:tab algn="l" pos="0"/>
+              </a:tabLst>
+            </a:pPr>
+            <a:endParaRPr b="0" lang="en-US" sz="2400" spc="-1" strike="noStrike">
+              <a:solidFill>
+                <a:srgbClr val="000000"/>
+              </a:solidFill>
+              <a:latin typeface="Arial"/>
+            </a:endParaRPr>
+          </a:p>
+          <a:p>
+            <a:pPr marL="432000" indent="-324000">
+              <a:spcBef>
+                <a:spcPts val="1417"/>
+              </a:spcBef>
+              <a:buClr>
+                <a:srgbClr val="000000"/>
+              </a:buClr>
+              <a:buSzPct val="45000"/>
+              <a:buFont typeface="Wingdings" charset="2"/>
+              <a:buChar char=""/>
+            </a:pPr>
+            <a:r>
+              <a:rPr b="0" lang="en-US" sz="3200" spc="-1" strike="noStrike">
+                <a:solidFill>
+                  <a:srgbClr val="000000"/>
+                </a:solidFill>
+                <a:latin typeface="Arial"/>
+              </a:rPr>
+              <a:t>Το προπιονικό οξύ είναι το λιγότερο ευαίσθητο προιόν στις μεταβολές της ποσότητας του μιξ αλλά και της θερμοκρασίας. Παράγεται μάλλον από αναγωγή μίας ποσότητας του γαλακτικού οξέος που παράγεται.</a:t>
+            </a:r>
+            <a:endParaRPr b="0" lang="en-US" sz="3200" spc="-1" strike="noStrike">
+              <a:solidFill>
+                <a:srgbClr val="000000"/>
+              </a:solidFill>
+              <a:latin typeface="Arial"/>
+            </a:endParaRPr>
+          </a:p>
+          <a:p>
+            <a:pPr marL="432000" indent="-324000">
+              <a:spcBef>
+                <a:spcPts val="1417"/>
+              </a:spcBef>
+              <a:buClr>
+                <a:srgbClr val="000000"/>
+              </a:buClr>
+              <a:buSzPct val="45000"/>
+              <a:buFont typeface="Wingdings" charset="2"/>
+              <a:buChar char=""/>
+            </a:pPr>
+            <a:r>
+              <a:rPr b="0" lang="en-US" sz="3200" spc="-1" strike="noStrike">
+                <a:solidFill>
+                  <a:srgbClr val="000000"/>
+                </a:solidFill>
+                <a:latin typeface="Arial"/>
+              </a:rPr>
+              <a:t>Oι ποσότητες 4 και 8 mL του μιξ μοιάζουν αρκετά μεταξύ τους (το οποίο φαίνεται και από τα διαγράμματα και δοκιμάζοντας το “optimal” μεταβολικό μονοπάτι της μίας στην άλλη) και φάνηκε να έχουν αμελητέα ή και αρνητική επίδραση στο σύστημα σε σχέση με το 2 ml.</a:t>
+            </a:r>
+            <a:r>
+              <a:rPr b="0" lang="en-US" sz="3200" spc="-1" strike="noStrike">
+                <a:solidFill>
+                  <a:srgbClr val="000000"/>
+                </a:solidFill>
+                <a:latin typeface="Arial"/>
+              </a:rPr>
+              <a:t>	</a:t>
+            </a:r>
+            <a:endParaRPr b="0" lang="en-US" sz="3200" spc="-1" strike="noStrike">
+              <a:solidFill>
+                <a:srgbClr val="000000"/>
+              </a:solidFill>
+              <a:latin typeface="Arial"/>
+            </a:endParaRPr>
+          </a:p>
+          <a:p>
+            <a:pPr marL="432000" indent="-324000">
+              <a:spcBef>
+                <a:spcPts val="1417"/>
+              </a:spcBef>
+              <a:buClr>
+                <a:srgbClr val="000000"/>
+              </a:buClr>
+              <a:buSzPct val="45000"/>
+              <a:buFont typeface="Wingdings" charset="2"/>
+              <a:buChar char=""/>
+            </a:pPr>
+            <a:r>
+              <a:rPr b="0" lang="en-US" sz="3200" spc="-1" strike="noStrike">
+                <a:solidFill>
+                  <a:srgbClr val="000000"/>
+                </a:solidFill>
+                <a:latin typeface="Arial"/>
+              </a:rPr>
+              <a:t>Οι μικροοργανισμοί που υπάρχουν στα food waste μπορούν να παράξουν κάθε ένα από τα προιόντα που μετράμε, οπότε οι μικροοργανισμοί του μιξ φαίνεται να αλλάζουν μόνο τους ρυθμούς παραγωγής και όχι το προφίλ προιόντων.</a:t>
+            </a:r>
+            <a:endParaRPr b="0" lang="en-US" sz="3200" spc="-1" strike="noStrike">
+              <a:solidFill>
+                <a:srgbClr val="000000"/>
+              </a:solidFill>
+              <a:latin typeface="Arial"/>
+            </a:endParaRPr>
+          </a:p>
+          <a:p>
+            <a:pPr marL="432000" indent="0">
+              <a:lnSpc>
+                <a:spcPct val="90000"/>
+              </a:lnSpc>
+              <a:spcBef>
+                <a:spcPts val="1100"/>
+              </a:spcBef>
+              <a:buNone/>
+              <a:tabLst>
+                <a:tab algn="l" pos="0"/>
+              </a:tabLst>
+            </a:pPr>
+            <a:r>
+              <a:rPr b="0" lang="el-GR" sz="2400" spc="-1" strike="noStrike">
+                <a:solidFill>
+                  <a:schemeClr val="dk1"/>
+                </a:solidFill>
+                <a:latin typeface="Calibri"/>
+              </a:rPr>
+              <a:t> </a:t>
             </a:r>
             <a:endParaRPr b="0" lang="en-US" sz="2400" spc="-1" strike="noStrike">
               <a:solidFill>
@@ -7640,7 +8435,7 @@
         <p:spPr>
           <a:xfrm>
             <a:off x="228600" y="-228600"/>
-            <a:ext cx="11658240" cy="1243800"/>
+            <a:ext cx="11657880" cy="1243440"/>
           </a:xfrm>
           <a:prstGeom prst="rect">
             <a:avLst/>
@@ -7680,7 +8475,7 @@
                 </a:solidFill>
                 <a:latin typeface="Calibri"/>
               </a:rPr>
-              <a:t>Συγκριτικά διαγράμματα με βάση την ποσότητα του μιξ – Bar Plots</a:t>
+              <a:t>Συγκριτικά διαγράμματα με βάση την ποσότητα του μιξ</a:t>
             </a:r>
             <a:endParaRPr b="0" lang="en-US" sz="2800" spc="-1" strike="noStrike">
               <a:solidFill>
@@ -7704,7 +8499,7 @@
         <p:spPr>
           <a:xfrm>
             <a:off x="1766520" y="685800"/>
-            <a:ext cx="8977680" cy="5985000"/>
+            <a:ext cx="8977320" cy="5984640"/>
           </a:xfrm>
           <a:prstGeom prst="rect">
             <a:avLst/>
@@ -7757,7 +8552,7 @@
         <p:spPr>
           <a:xfrm>
             <a:off x="457200" y="168840"/>
-            <a:ext cx="10743840" cy="825840"/>
+            <a:ext cx="10743480" cy="825480"/>
           </a:xfrm>
           <a:prstGeom prst="rect">
             <a:avLst/>
@@ -7788,7 +8583,7 @@
                 </a:solidFill>
                 <a:latin typeface="Calibri"/>
               </a:rPr>
-              <a:t>Διαγράμματα Συγκεντρώσεων ανά ποσότητα μιξ – Bar Plots </a:t>
+              <a:t>Διαγράμματα Συγκεντρώσεων ανά ποσότητα μιξ </a:t>
             </a:r>
             <a:endParaRPr b="0" lang="en-US" sz="2800" spc="-1" strike="noStrike">
               <a:solidFill>
@@ -7812,7 +8607,7 @@
         <p:spPr>
           <a:xfrm>
             <a:off x="1233720" y="859680"/>
-            <a:ext cx="9777960" cy="5943600"/>
+            <a:ext cx="9777600" cy="5943240"/>
           </a:xfrm>
           <a:prstGeom prst="rect">
             <a:avLst/>
@@ -7865,7 +8660,7 @@
         <p:spPr>
           <a:xfrm>
             <a:off x="457200" y="168840"/>
-            <a:ext cx="10743840" cy="825840"/>
+            <a:ext cx="10743480" cy="825480"/>
           </a:xfrm>
           <a:prstGeom prst="rect">
             <a:avLst/>
@@ -7896,7 +8691,7 @@
                 </a:solidFill>
                 <a:latin typeface="Calibri"/>
               </a:rPr>
-              <a:t>Reduction Rate Σακχάρων – Bar Plots </a:t>
+              <a:t>Reduction Rate Σακχάρων </a:t>
             </a:r>
             <a:endParaRPr b="0" lang="en-US" sz="2800" spc="-1" strike="noStrike">
               <a:solidFill>
@@ -7920,7 +8715,7 @@
         <p:spPr>
           <a:xfrm>
             <a:off x="2057400" y="914400"/>
-            <a:ext cx="8120880" cy="5413680"/>
+            <a:ext cx="8120520" cy="5413320"/>
           </a:xfrm>
           <a:prstGeom prst="rect">
             <a:avLst/>
@@ -7972,8 +8767,8 @@
         </p:nvSpPr>
         <p:spPr>
           <a:xfrm>
-            <a:off x="228600" y="88200"/>
-            <a:ext cx="11658240" cy="825840"/>
+            <a:off x="457200" y="168840"/>
+            <a:ext cx="10743480" cy="825480"/>
           </a:xfrm>
           <a:prstGeom prst="rect">
             <a:avLst/>
@@ -8004,16 +8799,7 @@
                 </a:solidFill>
                 <a:latin typeface="Calibri"/>
               </a:rPr>
-              <a:t> </a:t>
-            </a:r>
-            <a:r>
-              <a:rPr b="0" lang="el-GR" sz="2800" spc="-1" strike="noStrike">
-                <a:solidFill>
-                  <a:schemeClr val="dk1"/>
-                </a:solidFill>
-                <a:latin typeface="Calibri"/>
-              </a:rPr>
-              <a:t>Συγκριτικά διαγράμματα με βάση την ποσότητα του μιξ – Scatter Plots</a:t>
+              <a:t>Πόση απτην οργανική ύλη μετράμε με την HPLC </a:t>
             </a:r>
             <a:endParaRPr b="0" lang="en-US" sz="2800" spc="-1" strike="noStrike">
               <a:solidFill>
@@ -8036,8 +8822,8 @@
         </p:blipFill>
         <p:spPr>
           <a:xfrm>
-            <a:off x="2057400" y="914040"/>
-            <a:ext cx="8749080" cy="5832720"/>
+            <a:off x="457200" y="1143000"/>
+            <a:ext cx="7892280" cy="5261400"/>
           </a:xfrm>
           <a:prstGeom prst="rect">
             <a:avLst/>
@@ -8047,6 +8833,73 @@
           </a:ln>
         </p:spPr>
       </p:pic>
+      <p:sp>
+        <p:nvSpPr>
+          <p:cNvPr id="94" name=""/>
+          <p:cNvSpPr txBox="1"/>
+          <p:nvPr/>
+        </p:nvSpPr>
+        <p:spPr>
+          <a:xfrm>
+            <a:off x="8686800" y="994320"/>
+            <a:ext cx="2971800" cy="5177880"/>
+          </a:xfrm>
+          <a:prstGeom prst="rect">
+            <a:avLst/>
+          </a:prstGeom>
+          <a:noFill/>
+          <a:ln w="0">
+            <a:noFill/>
+          </a:ln>
+        </p:spPr>
+        <p:txBody>
+          <a:bodyPr lIns="90000" rIns="90000" tIns="45000" bIns="45000" anchor="t">
+            <a:noAutofit/>
+          </a:bodyPr>
+          <a:p>
+            <a:r>
+              <a:rPr b="0" lang="en-US" sz="1800" spc="-1" strike="noStrike">
+                <a:solidFill>
+                  <a:srgbClr val="000000"/>
+                </a:solidFill>
+                <a:latin typeface="Arial"/>
+              </a:rPr>
+              <a:t>Την στιγμή 0, εκτός από το 4 (στο οποίο ίσως έγινε κάποιο σφάλμα στην μέτρηση του COD) όλα δείχνουν την HPLC και το COD πολύ κοντά μεταξύ τους άρα μετράμε μάλλον όλη την οργανική ύλη.</a:t>
+            </a:r>
+            <a:endParaRPr b="0" lang="en-US" sz="1800" spc="-1" strike="noStrike">
+              <a:solidFill>
+                <a:srgbClr val="000000"/>
+              </a:solidFill>
+              <a:latin typeface="Arial"/>
+            </a:endParaRPr>
+          </a:p>
+          <a:p>
+            <a:endParaRPr b="0" lang="en-US" sz="1800" spc="-1" strike="noStrike">
+              <a:solidFill>
+                <a:srgbClr val="000000"/>
+              </a:solidFill>
+              <a:latin typeface="Arial"/>
+            </a:endParaRPr>
+          </a:p>
+          <a:p>
+            <a:r>
+              <a:rPr b="0" lang="en-US" sz="1800" spc="-1" strike="noStrike">
+                <a:solidFill>
+                  <a:srgbClr val="000000"/>
+                </a:solidFill>
+                <a:latin typeface="Arial"/>
+              </a:rPr>
+              <a:t>Στο τέλος του πειράματος (t=72h), υπάρχει ένα λίγο πιο σημαντικό σφάλμα άρα μάλλον έχει παραχθεί κάτι που δεν μετράμε.</a:t>
+            </a:r>
+            <a:endParaRPr b="0" lang="en-US" sz="1800" spc="-1" strike="noStrike">
+              <a:solidFill>
+                <a:srgbClr val="000000"/>
+              </a:solidFill>
+              <a:latin typeface="Arial"/>
+            </a:endParaRPr>
+          </a:p>
+        </p:txBody>
+      </p:sp>
     </p:spTree>
   </p:cSld>
   <mc:AlternateContent>
@@ -8079,7 +8932,7 @@
       </p:grpSpPr>
       <p:sp>
         <p:nvSpPr>
-          <p:cNvPr id="94" name="PlaceHolder 1"/>
+          <p:cNvPr id="95" name="PlaceHolder 1"/>
           <p:cNvSpPr>
             <a:spLocks noGrp="1"/>
           </p:cNvSpPr>
@@ -8089,8 +8942,8 @@
         </p:nvSpPr>
         <p:spPr>
           <a:xfrm>
-            <a:off x="228960" y="228600"/>
-            <a:ext cx="11429280" cy="705960"/>
+            <a:off x="457200" y="-139680"/>
+            <a:ext cx="4572000" cy="825480"/>
           </a:xfrm>
           <a:prstGeom prst="rect">
             <a:avLst/>
@@ -8121,7 +8974,7 @@
                 </a:solidFill>
                 <a:latin typeface="Calibri"/>
               </a:rPr>
-              <a:t>Διαγράμματα Συγκεντρώσεων ανά ποσότητα μιξ – Scatter Plots </a:t>
+              <a:t>Χρωματογραφήματα t = 72h</a:t>
             </a:r>
             <a:endParaRPr b="0" lang="en-US" sz="2800" spc="-1" strike="noStrike">
               <a:solidFill>
@@ -8134,7 +8987,7 @@
       </p:sp>
       <p:pic>
         <p:nvPicPr>
-          <p:cNvPr id="95" name="" descr=""/>
+          <p:cNvPr id="96" name="" descr=""/>
           <p:cNvPicPr/>
           <p:nvPr/>
         </p:nvPicPr>
@@ -8144,8 +8997,8 @@
         </p:blipFill>
         <p:spPr>
           <a:xfrm>
-            <a:off x="1600200" y="934560"/>
-            <a:ext cx="9601200" cy="5760720"/>
+            <a:off x="124560" y="457200"/>
+            <a:ext cx="3908160" cy="2971800"/>
           </a:xfrm>
           <a:prstGeom prst="rect">
             <a:avLst/>
@@ -8155,6 +9008,308 @@
           </a:ln>
         </p:spPr>
       </p:pic>
+      <p:pic>
+        <p:nvPicPr>
+          <p:cNvPr id="97" name="" descr=""/>
+          <p:cNvPicPr/>
+          <p:nvPr/>
+        </p:nvPicPr>
+        <p:blipFill>
+          <a:blip r:embed="rId2"/>
+          <a:stretch/>
+        </p:blipFill>
+        <p:spPr>
+          <a:xfrm>
+            <a:off x="124560" y="3429000"/>
+            <a:ext cx="3990240" cy="3200400"/>
+          </a:xfrm>
+          <a:prstGeom prst="rect">
+            <a:avLst/>
+          </a:prstGeom>
+          <a:ln w="0">
+            <a:noFill/>
+          </a:ln>
+        </p:spPr>
+      </p:pic>
+      <p:pic>
+        <p:nvPicPr>
+          <p:cNvPr id="98" name="" descr=""/>
+          <p:cNvPicPr/>
+          <p:nvPr/>
+        </p:nvPicPr>
+        <p:blipFill>
+          <a:blip r:embed="rId3"/>
+          <a:stretch/>
+        </p:blipFill>
+        <p:spPr>
+          <a:xfrm>
+            <a:off x="4114800" y="457200"/>
+            <a:ext cx="3886200" cy="2976840"/>
+          </a:xfrm>
+          <a:prstGeom prst="rect">
+            <a:avLst/>
+          </a:prstGeom>
+          <a:ln w="0">
+            <a:noFill/>
+          </a:ln>
+        </p:spPr>
+      </p:pic>
+      <p:pic>
+        <p:nvPicPr>
+          <p:cNvPr id="99" name="" descr=""/>
+          <p:cNvPicPr/>
+          <p:nvPr/>
+        </p:nvPicPr>
+        <p:blipFill>
+          <a:blip r:embed="rId4"/>
+          <a:stretch/>
+        </p:blipFill>
+        <p:spPr>
+          <a:xfrm>
+            <a:off x="4114800" y="3429000"/>
+            <a:ext cx="3886200" cy="3200400"/>
+          </a:xfrm>
+          <a:prstGeom prst="rect">
+            <a:avLst/>
+          </a:prstGeom>
+          <a:ln w="0">
+            <a:noFill/>
+          </a:ln>
+        </p:spPr>
+      </p:pic>
+      <p:pic>
+        <p:nvPicPr>
+          <p:cNvPr id="100" name="" descr=""/>
+          <p:cNvPicPr/>
+          <p:nvPr/>
+        </p:nvPicPr>
+        <p:blipFill>
+          <a:blip r:embed="rId5"/>
+          <a:stretch/>
+        </p:blipFill>
+        <p:spPr>
+          <a:xfrm>
+            <a:off x="8001000" y="2057400"/>
+            <a:ext cx="3886200" cy="2971800"/>
+          </a:xfrm>
+          <a:prstGeom prst="rect">
+            <a:avLst/>
+          </a:prstGeom>
+          <a:ln w="0">
+            <a:noFill/>
+          </a:ln>
+        </p:spPr>
+      </p:pic>
+      <p:sp>
+        <p:nvSpPr>
+          <p:cNvPr id="101" name=""/>
+          <p:cNvSpPr txBox="1"/>
+          <p:nvPr/>
+        </p:nvSpPr>
+        <p:spPr>
+          <a:xfrm>
+            <a:off x="2971800" y="457200"/>
+            <a:ext cx="685800" cy="457200"/>
+          </a:xfrm>
+          <a:prstGeom prst="rect">
+            <a:avLst/>
+          </a:prstGeom>
+          <a:noFill/>
+          <a:ln w="0">
+            <a:noFill/>
+          </a:ln>
+        </p:spPr>
+        <p:txBody>
+          <a:bodyPr lIns="90000" rIns="90000" tIns="45000" bIns="45000" anchor="t">
+            <a:noAutofit/>
+          </a:bodyPr>
+          <a:p>
+            <a:r>
+              <a:rPr b="0" lang="en-US" sz="1800" spc="-1" strike="noStrike">
+                <a:solidFill>
+                  <a:srgbClr val="000000"/>
+                </a:solidFill>
+                <a:latin typeface="Arial"/>
+              </a:rPr>
+              <a:t>0 ml</a:t>
+            </a:r>
+            <a:endParaRPr b="0" lang="en-US" sz="1800" spc="-1" strike="noStrike">
+              <a:solidFill>
+                <a:srgbClr val="000000"/>
+              </a:solidFill>
+              <a:latin typeface="Arial"/>
+            </a:endParaRPr>
+          </a:p>
+        </p:txBody>
+      </p:sp>
+      <p:sp>
+        <p:nvSpPr>
+          <p:cNvPr id="102" name=""/>
+          <p:cNvSpPr txBox="1"/>
+          <p:nvPr/>
+        </p:nvSpPr>
+        <p:spPr>
+          <a:xfrm>
+            <a:off x="3200400" y="3657600"/>
+            <a:ext cx="685800" cy="457200"/>
+          </a:xfrm>
+          <a:prstGeom prst="rect">
+            <a:avLst/>
+          </a:prstGeom>
+          <a:noFill/>
+          <a:ln w="0">
+            <a:noFill/>
+          </a:ln>
+        </p:spPr>
+        <p:txBody>
+          <a:bodyPr lIns="90000" rIns="90000" tIns="45000" bIns="45000" anchor="t">
+            <a:noAutofit/>
+          </a:bodyPr>
+          <a:p>
+            <a:r>
+              <a:rPr b="0" lang="en-US" sz="1800" spc="-1" strike="noStrike">
+                <a:solidFill>
+                  <a:srgbClr val="000000"/>
+                </a:solidFill>
+                <a:latin typeface="Arial"/>
+              </a:rPr>
+              <a:t>1 ml</a:t>
+            </a:r>
+            <a:endParaRPr b="0" lang="en-US" sz="1800" spc="-1" strike="noStrike">
+              <a:solidFill>
+                <a:srgbClr val="000000"/>
+              </a:solidFill>
+              <a:latin typeface="Arial"/>
+            </a:endParaRPr>
+          </a:p>
+        </p:txBody>
+      </p:sp>
+      <p:sp>
+        <p:nvSpPr>
+          <p:cNvPr id="103" name=""/>
+          <p:cNvSpPr txBox="1"/>
+          <p:nvPr/>
+        </p:nvSpPr>
+        <p:spPr>
+          <a:xfrm>
+            <a:off x="7086600" y="457200"/>
+            <a:ext cx="685800" cy="457200"/>
+          </a:xfrm>
+          <a:prstGeom prst="rect">
+            <a:avLst/>
+          </a:prstGeom>
+          <a:noFill/>
+          <a:ln w="0">
+            <a:noFill/>
+          </a:ln>
+        </p:spPr>
+        <p:txBody>
+          <a:bodyPr lIns="90000" rIns="90000" tIns="45000" bIns="45000" anchor="t">
+            <a:noAutofit/>
+          </a:bodyPr>
+          <a:p>
+            <a:r>
+              <a:rPr b="0" lang="en-US" sz="1800" spc="-1" strike="noStrike">
+                <a:solidFill>
+                  <a:srgbClr val="000000"/>
+                </a:solidFill>
+                <a:latin typeface="Arial"/>
+              </a:rPr>
+              <a:t>2 ml</a:t>
+            </a:r>
+            <a:endParaRPr b="0" lang="en-US" sz="1800" spc="-1" strike="noStrike">
+              <a:solidFill>
+                <a:srgbClr val="000000"/>
+              </a:solidFill>
+              <a:latin typeface="Arial"/>
+            </a:endParaRPr>
+          </a:p>
+        </p:txBody>
+      </p:sp>
+      <p:sp>
+        <p:nvSpPr>
+          <p:cNvPr id="104" name=""/>
+          <p:cNvSpPr txBox="1"/>
+          <p:nvPr/>
+        </p:nvSpPr>
+        <p:spPr>
+          <a:xfrm>
+            <a:off x="7086600" y="3657600"/>
+            <a:ext cx="685800" cy="457200"/>
+          </a:xfrm>
+          <a:prstGeom prst="rect">
+            <a:avLst/>
+          </a:prstGeom>
+          <a:noFill/>
+          <a:ln w="0">
+            <a:noFill/>
+          </a:ln>
+        </p:spPr>
+        <p:txBody>
+          <a:bodyPr lIns="90000" rIns="90000" tIns="45000" bIns="45000" anchor="t">
+            <a:noAutofit/>
+          </a:bodyPr>
+          <a:p>
+            <a:r>
+              <a:rPr b="0" lang="en-US" sz="1800" spc="-1" strike="noStrike">
+                <a:solidFill>
+                  <a:srgbClr val="000000"/>
+                </a:solidFill>
+                <a:latin typeface="Arial"/>
+              </a:rPr>
+              <a:t>4 ml</a:t>
+            </a:r>
+            <a:endParaRPr b="0" lang="en-US" sz="1800" spc="-1" strike="noStrike">
+              <a:solidFill>
+                <a:srgbClr val="000000"/>
+              </a:solidFill>
+              <a:latin typeface="Arial"/>
+            </a:endParaRPr>
+          </a:p>
+        </p:txBody>
+      </p:sp>
+      <p:sp>
+        <p:nvSpPr>
+          <p:cNvPr id="105" name=""/>
+          <p:cNvSpPr txBox="1"/>
+          <p:nvPr/>
+        </p:nvSpPr>
+        <p:spPr>
+          <a:xfrm>
+            <a:off x="10972800" y="2286000"/>
+            <a:ext cx="685800" cy="457200"/>
+          </a:xfrm>
+          <a:prstGeom prst="rect">
+            <a:avLst/>
+          </a:prstGeom>
+          <a:noFill/>
+          <a:ln w="0">
+            <a:noFill/>
+          </a:ln>
+        </p:spPr>
+        <p:txBody>
+          <a:bodyPr lIns="90000" rIns="90000" tIns="45000" bIns="45000" anchor="t">
+            <a:noAutofit/>
+          </a:bodyPr>
+          <a:p>
+            <a:r>
+              <a:rPr b="0" lang="en-US" sz="1800" spc="-1" strike="noStrike">
+                <a:solidFill>
+                  <a:srgbClr val="000000"/>
+                </a:solidFill>
+                <a:latin typeface="Arial"/>
+              </a:rPr>
+              <a:t>8 ml</a:t>
+            </a:r>
+            <a:endParaRPr b="0" lang="en-US" sz="1800" spc="-1" strike="noStrike">
+              <a:solidFill>
+                <a:srgbClr val="000000"/>
+              </a:solidFill>
+              <a:latin typeface="Arial"/>
+            </a:endParaRPr>
+          </a:p>
+        </p:txBody>
+      </p:sp>
     </p:spTree>
   </p:cSld>
   <mc:AlternateContent>
@@ -8187,7 +9342,7 @@
       </p:grpSpPr>
       <p:sp>
         <p:nvSpPr>
-          <p:cNvPr id="96" name="PlaceHolder 1"/>
+          <p:cNvPr id="106" name="PlaceHolder 1"/>
           <p:cNvSpPr>
             <a:spLocks noGrp="1"/>
           </p:cNvSpPr>
@@ -8197,8 +9352,8 @@
         </p:nvSpPr>
         <p:spPr>
           <a:xfrm>
-            <a:off x="228960" y="228600"/>
-            <a:ext cx="11429280" cy="705960"/>
+            <a:off x="625320" y="54720"/>
+            <a:ext cx="10972440" cy="804240"/>
           </a:xfrm>
           <a:prstGeom prst="rect">
             <a:avLst/>
@@ -8213,25 +9368,93 @@
             <a:noAutofit/>
           </a:bodyPr>
           <a:p>
-            <a:pPr indent="0">
-              <a:lnSpc>
-                <a:spcPct val="100000"/>
-              </a:lnSpc>
-              <a:buNone/>
-              <a:tabLst>
-                <a:tab algn="l" pos="0"/>
-              </a:tabLst>
-            </a:pPr>
-            <a:r>
-              <a:rPr b="0" lang="el-GR" sz="2800" spc="-1" strike="noStrike">
+            <a:pPr indent="0" algn="ctr">
+              <a:buNone/>
+            </a:pPr>
+            <a:r>
+              <a:rPr b="0" lang="en-US" sz="2800" spc="-1" strike="noStrike">
                 <a:solidFill>
-                  <a:schemeClr val="dk1"/>
+                  <a:srgbClr val="000000"/>
                 </a:solidFill>
-                <a:latin typeface="Calibri"/>
+                <a:latin typeface="Arial"/>
               </a:rPr>
-              <a:t>Reduction Rate σακχάρων – Scatter Plots </a:t>
+              <a:t>Μεταβολικά μονοπάτια που ακολουθούνται</a:t>
             </a:r>
             <a:endParaRPr b="0" lang="en-US" sz="2800" spc="-1" strike="noStrike">
+              <a:solidFill>
+                <a:srgbClr val="000000"/>
+              </a:solidFill>
+              <a:latin typeface="Arial"/>
+            </a:endParaRPr>
+          </a:p>
+        </p:txBody>
+      </p:sp>
+      <p:sp>
+        <p:nvSpPr>
+          <p:cNvPr id="107" name="PlaceHolder 2"/>
+          <p:cNvSpPr>
+            <a:spLocks noGrp="1"/>
+          </p:cNvSpPr>
+          <p:nvPr>
+            <p:ph/>
+          </p:nvPr>
+        </p:nvSpPr>
+        <p:spPr>
+          <a:xfrm>
+            <a:off x="6302160" y="929160"/>
+            <a:ext cx="5354280" cy="5707080"/>
+          </a:xfrm>
+          <a:prstGeom prst="rect">
+            <a:avLst/>
+          </a:prstGeom>
+          <a:noFill/>
+          <a:ln w="0">
+            <a:noFill/>
+          </a:ln>
+        </p:spPr>
+        <p:txBody>
+          <a:bodyPr lIns="0" rIns="0" tIns="0" bIns="0" anchor="t">
+            <a:normAutofit/>
+          </a:bodyPr>
+          <a:p>
+            <a:pPr marL="432000" indent="0">
+              <a:spcBef>
+                <a:spcPts val="1417"/>
+              </a:spcBef>
+            </a:pPr>
+            <a:r>
+              <a:rPr b="0" lang="en-US" sz="2000" spc="-1" strike="noStrike">
+                <a:solidFill>
+                  <a:srgbClr val="000000"/>
+                </a:solidFill>
+                <a:latin typeface="Arial"/>
+              </a:rPr>
+              <a:t>Το αρχικό απόβλητο αποτελείται κυρίως από σακχαρόζη, γλυκόζη και φρουκτόζη. Για να ερμηνευθούν τα αποτελέσματα όπου παράγεται αιθανόλη και γαλακτικό οξύ, υποτέθηκε πως η γλυκόζη μετατρέπεται κατά 100% με heterolactic fermentation σε αιθανόλη και γαλακτικό ενώ η φρουκτόζη μπορεί να δώσει ως προιόντα οξικό και αιθανόλη, οξικό και προπιονικό ή αιθανόλη και προπιονικό, όπου το προπιονικό χρησιμοποιεί ως ενδιάμεσο το γαλακτικό και είναι πιθανόν να σταματήσει και εκεί.</a:t>
+            </a:r>
+            <a:endParaRPr b="0" lang="en-US" sz="2000" spc="-1" strike="noStrike">
+              <a:solidFill>
+                <a:srgbClr val="000000"/>
+              </a:solidFill>
+              <a:latin typeface="Arial"/>
+            </a:endParaRPr>
+          </a:p>
+          <a:p>
+            <a:pPr marL="432000" indent="0">
+              <a:spcBef>
+                <a:spcPts val="1417"/>
+              </a:spcBef>
+              <a:buNone/>
+            </a:pPr>
+            <a:r>
+              <a:rPr b="0" lang="en-US" sz="2000" spc="-1" strike="noStrike">
+                <a:solidFill>
+                  <a:srgbClr val="000000"/>
+                </a:solidFill>
+                <a:latin typeface="Arial"/>
+              </a:rPr>
+              <a:t>Επίσης, επειδή υπάρχει μία καθυστέρηση πριν εμφανιστούν τα προιόντα, έχει αγνοηθεί η φρουκτόζη που καταναλώνεται μεταξύ 48 και 72 ώρες.</a:t>
+            </a:r>
+            <a:endParaRPr b="0" lang="en-US" sz="2000" spc="-1" strike="noStrike">
               <a:solidFill>
                 <a:srgbClr val="000000"/>
               </a:solidFill>
@@ -8242,7 +9465,7 @@
       </p:sp>
       <p:pic>
         <p:nvPicPr>
-          <p:cNvPr id="97" name="" descr=""/>
+          <p:cNvPr id="108" name="" descr=""/>
           <p:cNvPicPr/>
           <p:nvPr/>
         </p:nvPicPr>
@@ -8252,8 +9475,8 @@
         </p:blipFill>
         <p:spPr>
           <a:xfrm>
-            <a:off x="2623320" y="1143000"/>
-            <a:ext cx="7663680" cy="5108760"/>
+            <a:off x="187200" y="1100520"/>
+            <a:ext cx="5646960" cy="4661280"/>
           </a:xfrm>
           <a:prstGeom prst="rect">
             <a:avLst/>
@@ -8295,7 +9518,7 @@
       </p:grpSpPr>
       <p:sp>
         <p:nvSpPr>
-          <p:cNvPr id="98" name="PlaceHolder 1"/>
+          <p:cNvPr id="109" name="PlaceHolder 1"/>
           <p:cNvSpPr>
             <a:spLocks noGrp="1"/>
           </p:cNvSpPr>
@@ -8305,8 +9528,8 @@
         </p:nvSpPr>
         <p:spPr>
           <a:xfrm>
-            <a:off x="914760" y="168840"/>
-            <a:ext cx="9143280" cy="825840"/>
+            <a:off x="625320" y="54720"/>
+            <a:ext cx="10972440" cy="804240"/>
           </a:xfrm>
           <a:prstGeom prst="rect">
             <a:avLst/>
@@ -8321,68 +9544,179 @@
             <a:noAutofit/>
           </a:bodyPr>
           <a:p>
-            <a:pPr indent="0">
-              <a:lnSpc>
-                <a:spcPct val="100000"/>
-              </a:lnSpc>
-              <a:buNone/>
-              <a:tabLst>
-                <a:tab algn="l" pos="0"/>
-              </a:tabLst>
-            </a:pPr>
-            <a:r>
-              <a:rPr b="0" lang="el-GR" sz="2800" spc="-1" strike="noStrike">
+            <a:pPr indent="0" algn="ctr">
+              <a:buNone/>
+            </a:pPr>
+            <a:r>
+              <a:rPr b="0" lang="en-US" sz="2800" spc="-1" strike="noStrike">
                 <a:solidFill>
-                  <a:schemeClr val="dk1"/>
+                  <a:srgbClr val="000000"/>
                 </a:solidFill>
-                <a:latin typeface="Calibri"/>
+                <a:latin typeface="Arial"/>
               </a:rPr>
-              <a:t>Υπενθύμιση αποτελεσμάτων του κινητικού πειράματος</a:t>
-            </a:r>
-            <a:br>
-              <a:rPr sz="2800"/>
-            </a:br>
-            <a:r>
-              <a:rPr b="0" lang="el-GR" sz="2800" spc="-1" strike="noStrike">
+              <a:t>Μεταβολικά μονοπάτια που ακολουθούνται II</a:t>
+            </a:r>
+            <a:endParaRPr b="0" lang="en-US" sz="2800" spc="-1" strike="noStrike">
+              <a:solidFill>
+                <a:srgbClr val="000000"/>
+              </a:solidFill>
+              <a:latin typeface="Arial"/>
+            </a:endParaRPr>
+          </a:p>
+        </p:txBody>
+      </p:sp>
+      <p:sp>
+        <p:nvSpPr>
+          <p:cNvPr id="110" name=""/>
+          <p:cNvSpPr txBox="1"/>
+          <p:nvPr/>
+        </p:nvSpPr>
+        <p:spPr>
+          <a:xfrm>
+            <a:off x="390240" y="843120"/>
+            <a:ext cx="11125440" cy="5262120"/>
+          </a:xfrm>
+          <a:prstGeom prst="rect">
+            <a:avLst/>
+          </a:prstGeom>
+          <a:noFill/>
+          <a:ln w="0">
+            <a:noFill/>
+          </a:ln>
+        </p:spPr>
+        <p:txBody>
+          <a:bodyPr lIns="90000" rIns="90000" tIns="45000" bIns="45000" anchor="t">
+            <a:noAutofit/>
+          </a:bodyPr>
+          <a:p>
+            <a:r>
+              <a:rPr b="0" lang="en-US" sz="2400" spc="-1" strike="noStrike">
                 <a:solidFill>
-                  <a:schemeClr val="dk1"/>
+                  <a:srgbClr val="000000"/>
                 </a:solidFill>
-                <a:latin typeface="Calibri"/>
+                <a:latin typeface="Arial"/>
               </a:rPr>
-              <a:t>(45 C θερμοκρασία, 2 mL mix, 2 επαναλήψεις)</a:t>
-            </a:r>
-            <a:endParaRPr b="0" lang="en-US" sz="2800" spc="-1" strike="noStrike">
-              <a:solidFill>
-                <a:srgbClr val="000000"/>
-              </a:solidFill>
-              <a:latin typeface="Arial"/>
-            </a:endParaRPr>
-          </a:p>
-        </p:txBody>
-      </p:sp>
-      <p:pic>
-        <p:nvPicPr>
-          <p:cNvPr id="99" name="" descr=""/>
-          <p:cNvPicPr/>
-          <p:nvPr/>
-        </p:nvPicPr>
-        <p:blipFill>
-          <a:blip r:embed="rId1"/>
-          <a:stretch/>
-        </p:blipFill>
-        <p:spPr>
-          <a:xfrm>
-            <a:off x="1766520" y="1143000"/>
-            <a:ext cx="8291880" cy="5527800"/>
-          </a:xfrm>
-          <a:prstGeom prst="rect">
-            <a:avLst/>
-          </a:prstGeom>
-          <a:ln w="0">
-            <a:noFill/>
-          </a:ln>
-        </p:spPr>
-      </p:pic>
+              <a:t>Τα δύο βασικά προβλήματα που παρουσιάζονται είναι: Επειδή κάνουμε ένα batch πείραμα σε μη μόνιμη κατάσταση, οι στοιχειομετρίες που έχουν υποτεθεί δεν είναι σίγουρο ότι ισχύουν. Έχουμε υποθέσει πως όλα τα σάκχαρα πάνε προς μεταβολικά προιόντα και τα προιόντα δεν καταναλώνονται, ενώ στην πράξη, όλα αυτά καταναλώνονται και για ανάπτυξη της βιομάζας σε ένα βαθμό.</a:t>
+            </a:r>
+            <a:endParaRPr b="0" lang="en-US" sz="2400" spc="-1" strike="noStrike">
+              <a:solidFill>
+                <a:srgbClr val="000000"/>
+              </a:solidFill>
+              <a:latin typeface="Arial"/>
+            </a:endParaRPr>
+          </a:p>
+          <a:p>
+            <a:endParaRPr b="0" lang="en-US" sz="2400" spc="-1" strike="noStrike">
+              <a:solidFill>
+                <a:srgbClr val="000000"/>
+              </a:solidFill>
+              <a:latin typeface="Arial"/>
+            </a:endParaRPr>
+          </a:p>
+          <a:p>
+            <a:r>
+              <a:rPr b="0" lang="en-US" sz="2400" spc="-1" strike="noStrike">
+                <a:solidFill>
+                  <a:srgbClr val="000000"/>
+                </a:solidFill>
+                <a:latin typeface="Arial"/>
+              </a:rPr>
+              <a:t>Όμως, παρόλα αυτά, προκύπτουν κάποιες πολύ καλές προσεγγίσεις της κατάστασης στις 72 ώρες με τις εξής επιλογές:</a:t>
+            </a:r>
+            <a:endParaRPr b="0" lang="en-US" sz="2400" spc="-1" strike="noStrike">
+              <a:solidFill>
+                <a:srgbClr val="000000"/>
+              </a:solidFill>
+              <a:latin typeface="Arial"/>
+            </a:endParaRPr>
+          </a:p>
+          <a:p>
+            <a:r>
+              <a:rPr b="0" lang="en-US" sz="2400" spc="-1" strike="noStrike">
+                <a:solidFill>
+                  <a:srgbClr val="000000"/>
+                </a:solidFill>
+                <a:latin typeface="Arial"/>
+              </a:rPr>
+              <a:t>- 0 ml: 68% σε acetate-ethanol (AE), 25% σε acetate-propionate (AP) με αναλογία 1:2, 7% σε propionate-ethanol (PE)</a:t>
+            </a:r>
+            <a:endParaRPr b="0" lang="en-US" sz="2400" spc="-1" strike="noStrike">
+              <a:solidFill>
+                <a:srgbClr val="000000"/>
+              </a:solidFill>
+              <a:latin typeface="Arial"/>
+            </a:endParaRPr>
+          </a:p>
+          <a:p>
+            <a:r>
+              <a:rPr b="0" lang="en-US" sz="2400" spc="-1" strike="noStrike">
+                <a:solidFill>
+                  <a:srgbClr val="000000"/>
+                </a:solidFill>
+                <a:latin typeface="Arial"/>
+              </a:rPr>
+              <a:t>- 1 ml: 21% σε AE, 79% σε AP με το 54% αυτού να είναι οξικό</a:t>
+            </a:r>
+            <a:endParaRPr b="0" lang="en-US" sz="2400" spc="-1" strike="noStrike">
+              <a:solidFill>
+                <a:srgbClr val="000000"/>
+              </a:solidFill>
+              <a:latin typeface="Arial"/>
+            </a:endParaRPr>
+          </a:p>
+          <a:p>
+            <a:r>
+              <a:rPr b="0" lang="en-US" sz="2400" spc="-1" strike="noStrike">
+                <a:solidFill>
+                  <a:srgbClr val="000000"/>
+                </a:solidFill>
+                <a:latin typeface="Arial"/>
+              </a:rPr>
+              <a:t>- 2 ml: 33% σε AE, 3% σε AP και 64% σε PE</a:t>
+            </a:r>
+            <a:endParaRPr b="0" lang="en-US" sz="2400" spc="-1" strike="noStrike">
+              <a:solidFill>
+                <a:srgbClr val="000000"/>
+              </a:solidFill>
+              <a:latin typeface="Arial"/>
+            </a:endParaRPr>
+          </a:p>
+          <a:p>
+            <a:r>
+              <a:rPr b="0" lang="en-US" sz="2400" spc="-1" strike="noStrike">
+                <a:solidFill>
+                  <a:srgbClr val="000000"/>
+                </a:solidFill>
+                <a:latin typeface="Arial"/>
+              </a:rPr>
+              <a:t>- 4 ml: 37% σε AE, 18% σε AP, 45% σε PE</a:t>
+            </a:r>
+            <a:endParaRPr b="0" lang="en-US" sz="2400" spc="-1" strike="noStrike">
+              <a:solidFill>
+                <a:srgbClr val="000000"/>
+              </a:solidFill>
+              <a:latin typeface="Arial"/>
+            </a:endParaRPr>
+          </a:p>
+          <a:p>
+            <a:r>
+              <a:rPr b="0" lang="en-US" sz="2400" spc="-1" strike="noStrike">
+                <a:solidFill>
+                  <a:srgbClr val="000000"/>
+                </a:solidFill>
+                <a:latin typeface="Arial"/>
+              </a:rPr>
+              <a:t>- 8 ml: 45% σε AE, 7% σε AP, 48% σε PE</a:t>
+            </a:r>
+            <a:endParaRPr b="0" lang="en-US" sz="2400" spc="-1" strike="noStrike">
+              <a:solidFill>
+                <a:srgbClr val="000000"/>
+              </a:solidFill>
+              <a:latin typeface="Arial"/>
+            </a:endParaRPr>
+          </a:p>
+        </p:txBody>
+      </p:sp>
     </p:spTree>
   </p:cSld>
   <mc:AlternateContent>

</xml_diff>